<commit_message>
SIVARIA2-142 Presentation documentation update
</commit_message>
<xml_diff>
--- a/docs/presentation/SiVA_esitlus_EST.pptx
+++ b/docs/presentation/SiVA_esitlus_EST.pptx
@@ -111,6 +111,22 @@
       </a:defRPr>
     </a:lvl9pPr>
   </p:defaultTextStyle>
+  <p:extLst>
+    <p:ext uri="{EFAFB233-063F-42B5-8137-9DF3F51BA10A}">
+      <p15:sldGuideLst xmlns:p15="http://schemas.microsoft.com/office/powerpoint/2012/main">
+        <p15:guide id="1" orient="horz" pos="2160">
+          <p15:clr>
+            <a:srgbClr val="A4A3A4"/>
+          </p15:clr>
+        </p15:guide>
+        <p15:guide id="2" pos="2880">
+          <p15:clr>
+            <a:srgbClr val="A4A3A4"/>
+          </p15:clr>
+        </p15:guide>
+      </p15:sldGuideLst>
+    </p:ext>
+  </p:extLst>
 </p:presentation>
 </file>
 
@@ -295,7 +311,7 @@
           <a:p>
             <a:fld id="{E433F68C-4E42-2447-8901-54127AFE75BC}" type="datetimeFigureOut">
               <a:rPr lang="en-US" smtClean="0"/>
-              <a:t>13/10/16</a:t>
+              <a:t>12/20/2017</a:t>
             </a:fld>
             <a:endParaRPr lang="en-US"/>
           </a:p>
@@ -465,7 +481,7 @@
           <a:p>
             <a:fld id="{E433F68C-4E42-2447-8901-54127AFE75BC}" type="datetimeFigureOut">
               <a:rPr lang="en-US" smtClean="0"/>
-              <a:t>13/10/16</a:t>
+              <a:t>12/20/2017</a:t>
             </a:fld>
             <a:endParaRPr lang="en-US"/>
           </a:p>
@@ -645,7 +661,7 @@
           <a:p>
             <a:fld id="{E433F68C-4E42-2447-8901-54127AFE75BC}" type="datetimeFigureOut">
               <a:rPr lang="en-US" smtClean="0"/>
-              <a:t>13/10/16</a:t>
+              <a:t>12/20/2017</a:t>
             </a:fld>
             <a:endParaRPr lang="en-US"/>
           </a:p>
@@ -815,7 +831,7 @@
           <a:p>
             <a:fld id="{E433F68C-4E42-2447-8901-54127AFE75BC}" type="datetimeFigureOut">
               <a:rPr lang="en-US" smtClean="0"/>
-              <a:t>13/10/16</a:t>
+              <a:t>12/20/2017</a:t>
             </a:fld>
             <a:endParaRPr lang="en-US"/>
           </a:p>
@@ -1061,7 +1077,7 @@
           <a:p>
             <a:fld id="{E433F68C-4E42-2447-8901-54127AFE75BC}" type="datetimeFigureOut">
               <a:rPr lang="en-US" smtClean="0"/>
-              <a:t>13/10/16</a:t>
+              <a:t>12/20/2017</a:t>
             </a:fld>
             <a:endParaRPr lang="en-US"/>
           </a:p>
@@ -1349,7 +1365,7 @@
           <a:p>
             <a:fld id="{E433F68C-4E42-2447-8901-54127AFE75BC}" type="datetimeFigureOut">
               <a:rPr lang="en-US" smtClean="0"/>
-              <a:t>13/10/16</a:t>
+              <a:t>12/20/2017</a:t>
             </a:fld>
             <a:endParaRPr lang="en-US"/>
           </a:p>
@@ -1771,7 +1787,7 @@
           <a:p>
             <a:fld id="{E433F68C-4E42-2447-8901-54127AFE75BC}" type="datetimeFigureOut">
               <a:rPr lang="en-US" smtClean="0"/>
-              <a:t>13/10/16</a:t>
+              <a:t>12/20/2017</a:t>
             </a:fld>
             <a:endParaRPr lang="en-US"/>
           </a:p>
@@ -1889,7 +1905,7 @@
           <a:p>
             <a:fld id="{E433F68C-4E42-2447-8901-54127AFE75BC}" type="datetimeFigureOut">
               <a:rPr lang="en-US" smtClean="0"/>
-              <a:t>13/10/16</a:t>
+              <a:t>12/20/2017</a:t>
             </a:fld>
             <a:endParaRPr lang="en-US"/>
           </a:p>
@@ -1984,7 +2000,7 @@
           <a:p>
             <a:fld id="{E433F68C-4E42-2447-8901-54127AFE75BC}" type="datetimeFigureOut">
               <a:rPr lang="en-US" smtClean="0"/>
-              <a:t>13/10/16</a:t>
+              <a:t>12/20/2017</a:t>
             </a:fld>
             <a:endParaRPr lang="en-US"/>
           </a:p>
@@ -2261,7 +2277,7 @@
           <a:p>
             <a:fld id="{E433F68C-4E42-2447-8901-54127AFE75BC}" type="datetimeFigureOut">
               <a:rPr lang="en-US" smtClean="0"/>
-              <a:t>13/10/16</a:t>
+              <a:t>12/20/2017</a:t>
             </a:fld>
             <a:endParaRPr lang="en-US"/>
           </a:p>
@@ -2514,7 +2530,7 @@
           <a:p>
             <a:fld id="{E433F68C-4E42-2447-8901-54127AFE75BC}" type="datetimeFigureOut">
               <a:rPr lang="en-US" smtClean="0"/>
-              <a:t>13/10/16</a:t>
+              <a:t>12/20/2017</a:t>
             </a:fld>
             <a:endParaRPr lang="en-US"/>
           </a:p>
@@ -2727,7 +2743,7 @@
           <a:p>
             <a:fld id="{E433F68C-4E42-2447-8901-54127AFE75BC}" type="datetimeFigureOut">
               <a:rPr lang="en-US" smtClean="0"/>
-              <a:t>13/10/16</a:t>
+              <a:t>12/20/2017</a:t>
             </a:fld>
             <a:endParaRPr lang="en-US"/>
           </a:p>
@@ -3153,15 +3169,21 @@
           <p:nvPr/>
         </p:nvPicPr>
         <p:blipFill>
-          <a:blip r:embed="rId2"/>
+          <a:blip r:embed="rId2">
+            <a:extLst>
+              <a:ext uri="{28A0092B-C50C-407E-A947-70E740481C1C}">
+                <a14:useLocalDpi xmlns:a14="http://schemas.microsoft.com/office/drawing/2010/main" val="0"/>
+              </a:ext>
+            </a:extLst>
+          </a:blip>
           <a:stretch>
             <a:fillRect/>
           </a:stretch>
         </p:blipFill>
         <p:spPr>
           <a:xfrm>
-            <a:off x="5741816" y="361821"/>
-            <a:ext cx="3237083" cy="1873380"/>
+            <a:off x="5746159" y="361821"/>
+            <a:ext cx="3228397" cy="1873380"/>
           </a:xfrm>
           <a:prstGeom prst="rect">
             <a:avLst/>
@@ -3181,7 +3203,7 @@
   <p:timing>
     <p:tnLst>
       <p:par>
-        <p:cTn xmlns:p14="http://schemas.microsoft.com/office/powerpoint/2010/main" id="1" dur="indefinite" restart="never" nodeType="tmRoot"/>
+        <p:cTn id="1" dur="indefinite" restart="never" nodeType="tmRoot"/>
       </p:par>
     </p:tnLst>
   </p:timing>
@@ -3267,7 +3289,9 @@
         </p:nvSpPr>
         <p:spPr/>
         <p:txBody>
-          <a:bodyPr/>
+          <a:bodyPr>
+            <a:normAutofit lnSpcReduction="10000"/>
+          </a:bodyPr>
           <a:lstStyle/>
           <a:p>
             <a:pPr>
@@ -3438,15 +3462,28 @@
             <a:pPr lvl="1"/>
             <a:r>
               <a:rPr lang="et-EE" sz="1800" dirty="0" smtClean="0"/>
-              <a:t>X-tee v6 turvaserveri </a:t>
-            </a:r>
-            <a:r>
-              <a:rPr lang="et-EE" sz="1800" dirty="0" err="1" smtClean="0"/>
-              <a:t>ASiCE</a:t>
-            </a:r>
+              <a:t>X-tee v6 turvaserveri ASiCE konteinerid;</a:t>
+            </a:r>
+          </a:p>
+          <a:p>
+            <a:pPr lvl="1"/>
             <a:r>
               <a:rPr lang="et-EE" sz="1800" dirty="0" smtClean="0"/>
-              <a:t> konteinerid.</a:t>
+              <a:t>ASiCE ja ASiCS konteinerid;</a:t>
+            </a:r>
+          </a:p>
+          <a:p>
+            <a:pPr lvl="1"/>
+            <a:r>
+              <a:rPr lang="et-EE" sz="1800" dirty="0" smtClean="0"/>
+              <a:t>XAdES allkirjad;</a:t>
+            </a:r>
+          </a:p>
+          <a:p>
+            <a:pPr lvl="1"/>
+            <a:r>
+              <a:rPr lang="et-EE" sz="1800" dirty="0" smtClean="0"/>
+              <a:t>CAdES allkirjad.</a:t>
             </a:r>
             <a:endParaRPr lang="en-US" sz="1800" dirty="0" smtClean="0"/>
           </a:p>
@@ -3465,7 +3502,7 @@
   <p:timing>
     <p:tnLst>
       <p:par>
-        <p:cTn xmlns:p14="http://schemas.microsoft.com/office/powerpoint/2010/main" id="1" dur="indefinite" restart="never" nodeType="tmRoot"/>
+        <p:cTn id="1" dur="indefinite" restart="never" nodeType="tmRoot"/>
       </p:par>
     </p:tnLst>
   </p:timing>
@@ -3489,30 +3526,6 @@
           <a:chExt cx="0" cy="0"/>
         </a:xfrm>
       </p:grpSpPr>
-      <p:pic>
-        <p:nvPicPr>
-          <p:cNvPr id="4" name="Pilt 3"/>
-          <p:cNvPicPr>
-            <a:picLocks noChangeAspect="1"/>
-          </p:cNvPicPr>
-          <p:nvPr/>
-        </p:nvPicPr>
-        <p:blipFill>
-          <a:blip r:embed="rId2"/>
-          <a:stretch>
-            <a:fillRect/>
-          </a:stretch>
-        </p:blipFill>
-        <p:spPr>
-          <a:xfrm>
-            <a:off x="457200" y="512968"/>
-            <a:ext cx="8286750" cy="5876925"/>
-          </a:xfrm>
-          <a:prstGeom prst="rect">
-            <a:avLst/>
-          </a:prstGeom>
-        </p:spPr>
-      </p:pic>
       <p:sp>
         <p:nvSpPr>
           <p:cNvPr id="2" name="Title 1"/>
@@ -3555,6 +3568,36 @@
           </a:p>
         </p:txBody>
       </p:sp>
+      <p:pic>
+        <p:nvPicPr>
+          <p:cNvPr id="4" name="Picture 3"/>
+          <p:cNvPicPr>
+            <a:picLocks noChangeAspect="1"/>
+          </p:cNvPicPr>
+          <p:nvPr/>
+        </p:nvPicPr>
+        <p:blipFill>
+          <a:blip r:embed="rId2">
+            <a:extLst>
+              <a:ext uri="{28A0092B-C50C-407E-A947-70E740481C1C}">
+                <a14:useLocalDpi xmlns:a14="http://schemas.microsoft.com/office/drawing/2010/main" val="0"/>
+              </a:ext>
+            </a:extLst>
+          </a:blip>
+          <a:stretch>
+            <a:fillRect/>
+          </a:stretch>
+        </p:blipFill>
+        <p:spPr>
+          <a:xfrm>
+            <a:off x="782515" y="1417638"/>
+            <a:ext cx="7578969" cy="4935687"/>
+          </a:xfrm>
+          <a:prstGeom prst="rect">
+            <a:avLst/>
+          </a:prstGeom>
+        </p:spPr>
+      </p:pic>
     </p:spTree>
     <p:extLst>
       <p:ext uri="{BB962C8B-B14F-4D97-AF65-F5344CB8AC3E}">
@@ -3568,7 +3611,7 @@
   <p:timing>
     <p:tnLst>
       <p:par>
-        <p:cTn xmlns:p14="http://schemas.microsoft.com/office/powerpoint/2010/main" id="1" dur="indefinite" restart="never" nodeType="tmRoot"/>
+        <p:cTn id="1" dur="indefinite" restart="never" nodeType="tmRoot"/>
       </p:par>
     </p:tnLst>
   </p:timing>
@@ -3651,3111 +3694,30 @@
           </a:p>
         </p:txBody>
       </p:sp>
-      <p:graphicFrame>
-        <p:nvGraphicFramePr>
-          <p:cNvPr id="4" name="Tabel 4"/>
-          <p:cNvGraphicFramePr>
-            <a:graphicFrameLocks noGrp="1"/>
-          </p:cNvGraphicFramePr>
-          <p:nvPr>
-            <p:extLst>
-              <p:ext uri="{D42A27DB-BD31-4B8C-83A1-F6EECF244321}">
-                <p14:modId xmlns:p14="http://schemas.microsoft.com/office/powerpoint/2010/main" val="1404935705"/>
-              </p:ext>
-            </p:extLst>
-          </p:nvPr>
-        </p:nvGraphicFramePr>
-        <p:xfrm>
-          <a:off x="1524000" y="1782770"/>
-          <a:ext cx="6095999" cy="3503929"/>
-        </p:xfrm>
-        <a:graphic>
-          <a:graphicData uri="http://schemas.openxmlformats.org/drawingml/2006/table">
-            <a:tbl>
-              <a:tblPr firstRow="1" bandRow="1">
-                <a:tableStyleId>{073A0DAA-6AF3-43AB-8588-CEC1D06C72B9}</a:tableStyleId>
-              </a:tblPr>
-              <a:tblGrid>
-                <a:gridCol w="870857">
-                  <a:extLst>
-                    <a:ext uri="{9D8B030D-6E8A-4147-A177-3AD203B41FA5}">
-                      <a16:colId xmlns="" xmlns:a16="http://schemas.microsoft.com/office/drawing/2014/main" val="20000"/>
-                    </a:ext>
-                  </a:extLst>
-                </a:gridCol>
-                <a:gridCol w="870857">
-                  <a:extLst>
-                    <a:ext uri="{9D8B030D-6E8A-4147-A177-3AD203B41FA5}">
-                      <a16:colId xmlns="" xmlns:a16="http://schemas.microsoft.com/office/drawing/2014/main" val="20001"/>
-                    </a:ext>
-                  </a:extLst>
-                </a:gridCol>
-                <a:gridCol w="870857">
-                  <a:extLst>
-                    <a:ext uri="{9D8B030D-6E8A-4147-A177-3AD203B41FA5}">
-                      <a16:colId xmlns="" xmlns:a16="http://schemas.microsoft.com/office/drawing/2014/main" val="20002"/>
-                    </a:ext>
-                  </a:extLst>
-                </a:gridCol>
-                <a:gridCol w="870857">
-                  <a:extLst>
-                    <a:ext uri="{9D8B030D-6E8A-4147-A177-3AD203B41FA5}">
-                      <a16:colId xmlns="" xmlns:a16="http://schemas.microsoft.com/office/drawing/2014/main" val="20003"/>
-                    </a:ext>
-                  </a:extLst>
-                </a:gridCol>
-                <a:gridCol w="870857">
-                  <a:extLst>
-                    <a:ext uri="{9D8B030D-6E8A-4147-A177-3AD203B41FA5}">
-                      <a16:colId xmlns="" xmlns:a16="http://schemas.microsoft.com/office/drawing/2014/main" val="20004"/>
-                    </a:ext>
-                  </a:extLst>
-                </a:gridCol>
-                <a:gridCol w="870857">
-                  <a:extLst>
-                    <a:ext uri="{9D8B030D-6E8A-4147-A177-3AD203B41FA5}">
-                      <a16:colId xmlns="" xmlns:a16="http://schemas.microsoft.com/office/drawing/2014/main" val="20005"/>
-                    </a:ext>
-                  </a:extLst>
-                </a:gridCol>
-                <a:gridCol w="870857">
-                  <a:extLst>
-                    <a:ext uri="{9D8B030D-6E8A-4147-A177-3AD203B41FA5}">
-                      <a16:colId xmlns="" xmlns:a16="http://schemas.microsoft.com/office/drawing/2014/main" val="20006"/>
-                    </a:ext>
-                  </a:extLst>
-                </a:gridCol>
-              </a:tblGrid>
-              <a:tr h="370840">
-                <a:tc>
-                  <a:txBody>
-                    <a:bodyPr/>
-                    <a:lstStyle/>
-                    <a:p>
-                      <a:pPr algn="l" fontAlgn="t"/>
-                      <a:r>
-                        <a:rPr lang="en-US" sz="1000" b="1" dirty="0" err="1">
-                          <a:solidFill>
-                            <a:srgbClr val="FFFFFF"/>
-                          </a:solidFill>
-                          <a:effectLst/>
-                          <a:latin typeface="DIN-Regular"/>
-                        </a:rPr>
-                        <a:t>Allkirja</a:t>
-                      </a:r>
-                      <a:r>
-                        <a:rPr lang="en-US" sz="1000" b="1" baseline="0" dirty="0">
-                          <a:solidFill>
-                            <a:srgbClr val="FFFFFF"/>
-                          </a:solidFill>
-                          <a:effectLst/>
-                          <a:latin typeface="DIN-Regular"/>
-                        </a:rPr>
-                        <a:t> forma</a:t>
-                      </a:r>
-                      <a:r>
-                        <a:rPr lang="et-EE" sz="1000" b="1" dirty="0">
-                          <a:solidFill>
-                            <a:srgbClr val="FFFFFF"/>
-                          </a:solidFill>
-                          <a:effectLst/>
-                          <a:latin typeface="DIN-Regular"/>
-                        </a:rPr>
-                        <a:t>at</a:t>
-                      </a:r>
-                    </a:p>
-                  </a:txBody>
-                  <a:tcPr marL="95250" marR="95250" marT="47625" marB="47625">
-                    <a:lnB w="6350" cap="flat" cmpd="sng" algn="ctr">
-                      <a:noFill/>
-                      <a:prstDash val="solid"/>
-                      <a:round/>
-                      <a:headEnd type="none" w="med" len="med"/>
-                      <a:tailEnd type="none" w="med" len="med"/>
-                    </a:lnB>
-                    <a:solidFill>
-                      <a:srgbClr val="FF6E0D"/>
-                    </a:solidFill>
-                  </a:tcPr>
-                </a:tc>
-                <a:tc>
-                  <a:txBody>
-                    <a:bodyPr/>
-                    <a:lstStyle/>
-                    <a:p>
-                      <a:pPr algn="l" fontAlgn="t"/>
-                      <a:r>
-                        <a:rPr lang="et-EE" sz="1000" dirty="0">
-                          <a:solidFill>
-                            <a:srgbClr val="FFFFFF"/>
-                          </a:solidFill>
-                          <a:effectLst/>
-                          <a:latin typeface="DIN-Regular"/>
-                        </a:rPr>
-                        <a:t>BASELINE_B_BES</a:t>
-                      </a:r>
-                    </a:p>
-                  </a:txBody>
-                  <a:tcPr marL="95250" marR="95250" marT="47625" marB="47625">
-                    <a:lnB w="6350" cap="flat" cmpd="sng" algn="ctr">
-                      <a:noFill/>
-                      <a:prstDash val="solid"/>
-                      <a:round/>
-                      <a:headEnd type="none" w="med" len="med"/>
-                      <a:tailEnd type="none" w="med" len="med"/>
-                    </a:lnB>
-                    <a:solidFill>
-                      <a:srgbClr val="FF6E0D"/>
-                    </a:solidFill>
-                  </a:tcPr>
-                </a:tc>
-                <a:tc>
-                  <a:txBody>
-                    <a:bodyPr/>
-                    <a:lstStyle/>
-                    <a:p>
-                      <a:pPr algn="l" fontAlgn="t"/>
-                      <a:r>
-                        <a:rPr lang="et-EE" sz="1000">
-                          <a:solidFill>
-                            <a:srgbClr val="FFFFFF"/>
-                          </a:solidFill>
-                          <a:effectLst/>
-                          <a:latin typeface="DIN-Regular"/>
-                        </a:rPr>
-                        <a:t>BASELINE_B_EPES</a:t>
-                      </a:r>
-                    </a:p>
-                  </a:txBody>
-                  <a:tcPr marL="95250" marR="95250" marT="47625" marB="47625">
-                    <a:lnB w="6350" cap="flat" cmpd="sng" algn="ctr">
-                      <a:noFill/>
-                      <a:prstDash val="solid"/>
-                      <a:round/>
-                      <a:headEnd type="none" w="med" len="med"/>
-                      <a:tailEnd type="none" w="med" len="med"/>
-                    </a:lnB>
-                    <a:solidFill>
-                      <a:srgbClr val="FF6E0D"/>
-                    </a:solidFill>
-                  </a:tcPr>
-                </a:tc>
-                <a:tc>
-                  <a:txBody>
-                    <a:bodyPr/>
-                    <a:lstStyle/>
-                    <a:p>
-                      <a:pPr algn="l" fontAlgn="t"/>
-                      <a:r>
-                        <a:rPr lang="et-EE" sz="1000">
-                          <a:solidFill>
-                            <a:srgbClr val="FFFFFF"/>
-                          </a:solidFill>
-                          <a:effectLst/>
-                          <a:latin typeface="DIN-Regular"/>
-                        </a:rPr>
-                        <a:t>BASELINE_T</a:t>
-                      </a:r>
-                    </a:p>
-                  </a:txBody>
-                  <a:tcPr marL="95250" marR="95250" marT="47625" marB="47625">
-                    <a:lnB w="6350" cap="flat" cmpd="sng" algn="ctr">
-                      <a:noFill/>
-                      <a:prstDash val="solid"/>
-                      <a:round/>
-                      <a:headEnd type="none" w="med" len="med"/>
-                      <a:tailEnd type="none" w="med" len="med"/>
-                    </a:lnB>
-                    <a:solidFill>
-                      <a:srgbClr val="FF6E0D"/>
-                    </a:solidFill>
-                  </a:tcPr>
-                </a:tc>
-                <a:tc>
-                  <a:txBody>
-                    <a:bodyPr/>
-                    <a:lstStyle/>
-                    <a:p>
-                      <a:pPr algn="l" fontAlgn="t"/>
-                      <a:r>
-                        <a:rPr lang="et-EE" sz="1000">
-                          <a:solidFill>
-                            <a:srgbClr val="FFFFFF"/>
-                          </a:solidFill>
-                          <a:effectLst/>
-                          <a:latin typeface="DIN-Regular"/>
-                        </a:rPr>
-                        <a:t>BASELINE_LT</a:t>
-                      </a:r>
-                    </a:p>
-                  </a:txBody>
-                  <a:tcPr marL="95250" marR="95250" marT="47625" marB="47625">
-                    <a:lnB w="6350" cap="flat" cmpd="sng" algn="ctr">
-                      <a:noFill/>
-                      <a:prstDash val="solid"/>
-                      <a:round/>
-                      <a:headEnd type="none" w="med" len="med"/>
-                      <a:tailEnd type="none" w="med" len="med"/>
-                    </a:lnB>
-                    <a:solidFill>
-                      <a:srgbClr val="FF6E0D"/>
-                    </a:solidFill>
-                  </a:tcPr>
-                </a:tc>
-                <a:tc>
-                  <a:txBody>
-                    <a:bodyPr/>
-                    <a:lstStyle/>
-                    <a:p>
-                      <a:pPr algn="l" fontAlgn="t"/>
-                      <a:r>
-                        <a:rPr lang="et-EE" sz="1000" dirty="0">
-                          <a:solidFill>
-                            <a:srgbClr val="FFFFFF"/>
-                          </a:solidFill>
-                          <a:effectLst/>
-                          <a:latin typeface="DIN-Regular"/>
-                        </a:rPr>
-                        <a:t>BASELINE_LT_TM</a:t>
-                      </a:r>
-                    </a:p>
-                  </a:txBody>
-                  <a:tcPr marL="95250" marR="95250" marT="47625" marB="47625">
-                    <a:lnB w="6350" cap="flat" cmpd="sng" algn="ctr">
-                      <a:noFill/>
-                      <a:prstDash val="solid"/>
-                      <a:round/>
-                      <a:headEnd type="none" w="med" len="med"/>
-                      <a:tailEnd type="none" w="med" len="med"/>
-                    </a:lnB>
-                    <a:solidFill>
-                      <a:srgbClr val="FF6E0D"/>
-                    </a:solidFill>
-                  </a:tcPr>
-                </a:tc>
-                <a:tc>
-                  <a:txBody>
-                    <a:bodyPr/>
-                    <a:lstStyle/>
-                    <a:p>
-                      <a:pPr algn="l" fontAlgn="t"/>
-                      <a:r>
-                        <a:rPr lang="et-EE" sz="1000">
-                          <a:solidFill>
-                            <a:srgbClr val="FFFFFF"/>
-                          </a:solidFill>
-                          <a:effectLst/>
-                          <a:latin typeface="DIN-Regular"/>
-                        </a:rPr>
-                        <a:t>BASELINE_LTA</a:t>
-                      </a:r>
-                    </a:p>
-                  </a:txBody>
-                  <a:tcPr marL="95250" marR="95250" marT="47625" marB="47625">
-                    <a:lnB w="6350" cap="flat" cmpd="sng" algn="ctr">
-                      <a:noFill/>
-                      <a:prstDash val="solid"/>
-                      <a:round/>
-                      <a:headEnd type="none" w="med" len="med"/>
-                      <a:tailEnd type="none" w="med" len="med"/>
-                    </a:lnB>
-                    <a:solidFill>
-                      <a:srgbClr val="FF6E0D"/>
-                    </a:solidFill>
-                  </a:tcPr>
-                </a:tc>
-                <a:extLst>
-                  <a:ext uri="{0D108BD9-81ED-4DB2-BD59-A6C34878D82A}">
-                    <a16:rowId xmlns="" xmlns:a16="http://schemas.microsoft.com/office/drawing/2014/main" val="10000"/>
-                  </a:ext>
-                </a:extLst>
-              </a:tr>
-              <a:tr h="370840">
-                <a:tc>
-                  <a:txBody>
-                    <a:bodyPr/>
-                    <a:lstStyle/>
-                    <a:p>
-                      <a:pPr algn="l" fontAlgn="t"/>
-                      <a:r>
-                        <a:rPr lang="et-EE" sz="1000" b="1" dirty="0">
-                          <a:solidFill>
-                            <a:srgbClr val="707070"/>
-                          </a:solidFill>
-                          <a:effectLst/>
-                          <a:latin typeface="DIN-Regular"/>
-                        </a:rPr>
-                        <a:t>BDOC</a:t>
-                      </a:r>
-                    </a:p>
-                  </a:txBody>
-                  <a:tcPr marL="95250" marR="95250" marT="47625" marB="47625">
-                    <a:lnL w="6350" cap="flat" cmpd="sng" algn="ctr">
-                      <a:noFill/>
-                      <a:prstDash val="solid"/>
-                      <a:round/>
-                      <a:headEnd type="none" w="med" len="med"/>
-                      <a:tailEnd type="none" w="med" len="med"/>
-                    </a:lnL>
-                    <a:lnR w="6350" cap="flat" cmpd="sng" algn="ctr">
-                      <a:noFill/>
-                      <a:prstDash val="solid"/>
-                      <a:round/>
-                      <a:headEnd type="none" w="med" len="med"/>
-                      <a:tailEnd type="none" w="med" len="med"/>
-                    </a:lnR>
-                    <a:lnT w="6350" cap="flat" cmpd="sng" algn="ctr">
-                      <a:noFill/>
-                      <a:prstDash val="solid"/>
-                      <a:round/>
-                      <a:headEnd type="none" w="med" len="med"/>
-                      <a:tailEnd type="none" w="med" len="med"/>
-                    </a:lnT>
-                    <a:lnB w="6350" cap="flat" cmpd="sng" algn="ctr">
-                      <a:solidFill>
-                        <a:srgbClr val="707070"/>
-                      </a:solidFill>
-                      <a:prstDash val="solid"/>
-                      <a:round/>
-                      <a:headEnd type="none" w="med" len="med"/>
-                      <a:tailEnd type="none" w="med" len="med"/>
-                    </a:lnB>
-                    <a:lnTlToBr w="12700" cmpd="sng">
-                      <a:noFill/>
-                      <a:prstDash val="solid"/>
-                    </a:lnTlToBr>
-                    <a:lnBlToTr w="12700" cmpd="sng">
-                      <a:noFill/>
-                      <a:prstDash val="solid"/>
-                    </a:lnBlToTr>
-                    <a:noFill/>
-                  </a:tcPr>
-                </a:tc>
-                <a:tc>
-                  <a:txBody>
-                    <a:bodyPr/>
-                    <a:lstStyle/>
-                    <a:p>
-                      <a:pPr algn="l" fontAlgn="t"/>
-                      <a:r>
-                        <a:rPr lang="et-EE" sz="1000" b="0">
-                          <a:solidFill>
-                            <a:srgbClr val="707070"/>
-                          </a:solidFill>
-                          <a:effectLst/>
-                          <a:latin typeface="DIN-Regular"/>
-                        </a:rPr>
-                        <a:t>NOK</a:t>
-                      </a:r>
-                    </a:p>
-                  </a:txBody>
-                  <a:tcPr marL="95250" marR="95250" marT="47625" marB="47625">
-                    <a:lnL w="6350" cap="flat" cmpd="sng" algn="ctr">
-                      <a:noFill/>
-                      <a:prstDash val="solid"/>
-                      <a:round/>
-                      <a:headEnd type="none" w="med" len="med"/>
-                      <a:tailEnd type="none" w="med" len="med"/>
-                    </a:lnL>
-                    <a:lnR w="6350" cap="flat" cmpd="sng" algn="ctr">
-                      <a:noFill/>
-                      <a:prstDash val="solid"/>
-                      <a:round/>
-                      <a:headEnd type="none" w="med" len="med"/>
-                      <a:tailEnd type="none" w="med" len="med"/>
-                    </a:lnR>
-                    <a:lnT w="6350" cap="flat" cmpd="sng" algn="ctr">
-                      <a:noFill/>
-                      <a:prstDash val="solid"/>
-                      <a:round/>
-                      <a:headEnd type="none" w="med" len="med"/>
-                      <a:tailEnd type="none" w="med" len="med"/>
-                    </a:lnT>
-                    <a:lnB w="6350" cap="flat" cmpd="sng" algn="ctr">
-                      <a:solidFill>
-                        <a:srgbClr val="707070"/>
-                      </a:solidFill>
-                      <a:prstDash val="solid"/>
-                      <a:round/>
-                      <a:headEnd type="none" w="med" len="med"/>
-                      <a:tailEnd type="none" w="med" len="med"/>
-                    </a:lnB>
-                    <a:lnTlToBr w="12700" cmpd="sng">
-                      <a:noFill/>
-                      <a:prstDash val="solid"/>
-                    </a:lnTlToBr>
-                    <a:lnBlToTr w="12700" cmpd="sng">
-                      <a:noFill/>
-                      <a:prstDash val="solid"/>
-                    </a:lnBlToTr>
-                    <a:noFill/>
-                  </a:tcPr>
-                </a:tc>
-                <a:tc>
-                  <a:txBody>
-                    <a:bodyPr/>
-                    <a:lstStyle/>
-                    <a:p>
-                      <a:pPr algn="l" fontAlgn="t"/>
-                      <a:r>
-                        <a:rPr lang="et-EE" sz="1000" b="0">
-                          <a:solidFill>
-                            <a:srgbClr val="707070"/>
-                          </a:solidFill>
-                          <a:effectLst/>
-                          <a:latin typeface="DIN-Regular"/>
-                        </a:rPr>
-                        <a:t>NOK</a:t>
-                      </a:r>
-                    </a:p>
-                  </a:txBody>
-                  <a:tcPr marL="95250" marR="95250" marT="47625" marB="47625">
-                    <a:lnL w="6350" cap="flat" cmpd="sng" algn="ctr">
-                      <a:noFill/>
-                      <a:prstDash val="solid"/>
-                      <a:round/>
-                      <a:headEnd type="none" w="med" len="med"/>
-                      <a:tailEnd type="none" w="med" len="med"/>
-                    </a:lnL>
-                    <a:lnR w="6350" cap="flat" cmpd="sng" algn="ctr">
-                      <a:noFill/>
-                      <a:prstDash val="solid"/>
-                      <a:round/>
-                      <a:headEnd type="none" w="med" len="med"/>
-                      <a:tailEnd type="none" w="med" len="med"/>
-                    </a:lnR>
-                    <a:lnT w="6350" cap="flat" cmpd="sng" algn="ctr">
-                      <a:noFill/>
-                      <a:prstDash val="solid"/>
-                      <a:round/>
-                      <a:headEnd type="none" w="med" len="med"/>
-                      <a:tailEnd type="none" w="med" len="med"/>
-                    </a:lnT>
-                    <a:lnB w="6350" cap="flat" cmpd="sng" algn="ctr">
-                      <a:solidFill>
-                        <a:srgbClr val="707070"/>
-                      </a:solidFill>
-                      <a:prstDash val="solid"/>
-                      <a:round/>
-                      <a:headEnd type="none" w="med" len="med"/>
-                      <a:tailEnd type="none" w="med" len="med"/>
-                    </a:lnB>
-                    <a:lnTlToBr w="12700" cmpd="sng">
-                      <a:noFill/>
-                      <a:prstDash val="solid"/>
-                    </a:lnTlToBr>
-                    <a:lnBlToTr w="12700" cmpd="sng">
-                      <a:noFill/>
-                      <a:prstDash val="solid"/>
-                    </a:lnBlToTr>
-                    <a:noFill/>
-                  </a:tcPr>
-                </a:tc>
-                <a:tc>
-                  <a:txBody>
-                    <a:bodyPr/>
-                    <a:lstStyle/>
-                    <a:p>
-                      <a:pPr algn="l" fontAlgn="t"/>
-                      <a:r>
-                        <a:rPr lang="et-EE" sz="1000" b="0">
-                          <a:solidFill>
-                            <a:srgbClr val="707070"/>
-                          </a:solidFill>
-                          <a:effectLst/>
-                          <a:latin typeface="DIN-Regular"/>
-                        </a:rPr>
-                        <a:t>NOK</a:t>
-                      </a:r>
-                    </a:p>
-                  </a:txBody>
-                  <a:tcPr marL="95250" marR="95250" marT="47625" marB="47625">
-                    <a:lnL w="6350" cap="flat" cmpd="sng" algn="ctr">
-                      <a:noFill/>
-                      <a:prstDash val="solid"/>
-                      <a:round/>
-                      <a:headEnd type="none" w="med" len="med"/>
-                      <a:tailEnd type="none" w="med" len="med"/>
-                    </a:lnL>
-                    <a:lnR w="6350" cap="flat" cmpd="sng" algn="ctr">
-                      <a:noFill/>
-                      <a:prstDash val="solid"/>
-                      <a:round/>
-                      <a:headEnd type="none" w="med" len="med"/>
-                      <a:tailEnd type="none" w="med" len="med"/>
-                    </a:lnR>
-                    <a:lnT w="6350" cap="flat" cmpd="sng" algn="ctr">
-                      <a:noFill/>
-                      <a:prstDash val="solid"/>
-                      <a:round/>
-                      <a:headEnd type="none" w="med" len="med"/>
-                      <a:tailEnd type="none" w="med" len="med"/>
-                    </a:lnT>
-                    <a:lnB w="6350" cap="flat" cmpd="sng" algn="ctr">
-                      <a:solidFill>
-                        <a:srgbClr val="707070"/>
-                      </a:solidFill>
-                      <a:prstDash val="solid"/>
-                      <a:round/>
-                      <a:headEnd type="none" w="med" len="med"/>
-                      <a:tailEnd type="none" w="med" len="med"/>
-                    </a:lnB>
-                    <a:lnTlToBr w="12700" cmpd="sng">
-                      <a:noFill/>
-                      <a:prstDash val="solid"/>
-                    </a:lnTlToBr>
-                    <a:lnBlToTr w="12700" cmpd="sng">
-                      <a:noFill/>
-                      <a:prstDash val="solid"/>
-                    </a:lnBlToTr>
-                    <a:noFill/>
-                  </a:tcPr>
-                </a:tc>
-                <a:tc>
-                  <a:txBody>
-                    <a:bodyPr/>
-                    <a:lstStyle/>
-                    <a:p>
-                      <a:pPr algn="l" fontAlgn="t"/>
-                      <a:r>
-                        <a:rPr lang="et-EE" sz="1000" b="0">
-                          <a:solidFill>
-                            <a:srgbClr val="707070"/>
-                          </a:solidFill>
-                          <a:effectLst/>
-                          <a:latin typeface="DIN-Regular"/>
-                        </a:rPr>
-                        <a:t>OK</a:t>
-                      </a:r>
-                    </a:p>
-                  </a:txBody>
-                  <a:tcPr marL="95250" marR="95250" marT="47625" marB="47625">
-                    <a:lnL w="6350" cap="flat" cmpd="sng" algn="ctr">
-                      <a:noFill/>
-                      <a:prstDash val="solid"/>
-                      <a:round/>
-                      <a:headEnd type="none" w="med" len="med"/>
-                      <a:tailEnd type="none" w="med" len="med"/>
-                    </a:lnL>
-                    <a:lnR w="6350" cap="flat" cmpd="sng" algn="ctr">
-                      <a:noFill/>
-                      <a:prstDash val="solid"/>
-                      <a:round/>
-                      <a:headEnd type="none" w="med" len="med"/>
-                      <a:tailEnd type="none" w="med" len="med"/>
-                    </a:lnR>
-                    <a:lnT w="6350" cap="flat" cmpd="sng" algn="ctr">
-                      <a:noFill/>
-                      <a:prstDash val="solid"/>
-                      <a:round/>
-                      <a:headEnd type="none" w="med" len="med"/>
-                      <a:tailEnd type="none" w="med" len="med"/>
-                    </a:lnT>
-                    <a:lnB w="6350" cap="flat" cmpd="sng" algn="ctr">
-                      <a:solidFill>
-                        <a:srgbClr val="707070"/>
-                      </a:solidFill>
-                      <a:prstDash val="solid"/>
-                      <a:round/>
-                      <a:headEnd type="none" w="med" len="med"/>
-                      <a:tailEnd type="none" w="med" len="med"/>
-                    </a:lnB>
-                    <a:lnTlToBr w="12700" cmpd="sng">
-                      <a:noFill/>
-                      <a:prstDash val="solid"/>
-                    </a:lnTlToBr>
-                    <a:lnBlToTr w="12700" cmpd="sng">
-                      <a:noFill/>
-                      <a:prstDash val="solid"/>
-                    </a:lnBlToTr>
-                    <a:noFill/>
-                  </a:tcPr>
-                </a:tc>
-                <a:tc>
-                  <a:txBody>
-                    <a:bodyPr/>
-                    <a:lstStyle/>
-                    <a:p>
-                      <a:pPr algn="l" fontAlgn="t"/>
-                      <a:r>
-                        <a:rPr lang="et-EE" sz="1000" b="0" dirty="0">
-                          <a:solidFill>
-                            <a:srgbClr val="707070"/>
-                          </a:solidFill>
-                          <a:effectLst/>
-                          <a:latin typeface="DIN-Regular"/>
-                        </a:rPr>
-                        <a:t>OK</a:t>
-                      </a:r>
-                    </a:p>
-                  </a:txBody>
-                  <a:tcPr marL="95250" marR="95250" marT="47625" marB="47625">
-                    <a:lnL w="6350" cap="flat" cmpd="sng" algn="ctr">
-                      <a:noFill/>
-                      <a:prstDash val="solid"/>
-                      <a:round/>
-                      <a:headEnd type="none" w="med" len="med"/>
-                      <a:tailEnd type="none" w="med" len="med"/>
-                    </a:lnL>
-                    <a:lnR w="6350" cap="flat" cmpd="sng" algn="ctr">
-                      <a:noFill/>
-                      <a:prstDash val="solid"/>
-                      <a:round/>
-                      <a:headEnd type="none" w="med" len="med"/>
-                      <a:tailEnd type="none" w="med" len="med"/>
-                    </a:lnR>
-                    <a:lnT w="6350" cap="flat" cmpd="sng" algn="ctr">
-                      <a:noFill/>
-                      <a:prstDash val="solid"/>
-                      <a:round/>
-                      <a:headEnd type="none" w="med" len="med"/>
-                      <a:tailEnd type="none" w="med" len="med"/>
-                    </a:lnT>
-                    <a:lnB w="6350" cap="flat" cmpd="sng" algn="ctr">
-                      <a:solidFill>
-                        <a:srgbClr val="707070"/>
-                      </a:solidFill>
-                      <a:prstDash val="solid"/>
-                      <a:round/>
-                      <a:headEnd type="none" w="med" len="med"/>
-                      <a:tailEnd type="none" w="med" len="med"/>
-                    </a:lnB>
-                    <a:lnTlToBr w="12700" cmpd="sng">
-                      <a:noFill/>
-                      <a:prstDash val="solid"/>
-                    </a:lnTlToBr>
-                    <a:lnBlToTr w="12700" cmpd="sng">
-                      <a:noFill/>
-                      <a:prstDash val="solid"/>
-                    </a:lnBlToTr>
-                    <a:noFill/>
-                  </a:tcPr>
-                </a:tc>
-                <a:tc>
-                  <a:txBody>
-                    <a:bodyPr/>
-                    <a:lstStyle/>
-                    <a:p>
-                      <a:pPr algn="l" fontAlgn="t"/>
-                      <a:r>
-                        <a:rPr lang="et-EE" sz="1000" b="0" dirty="0">
-                          <a:solidFill>
-                            <a:srgbClr val="707070"/>
-                          </a:solidFill>
-                          <a:effectLst/>
-                          <a:latin typeface="DIN-Regular"/>
-                        </a:rPr>
-                        <a:t>OK</a:t>
-                      </a:r>
-                    </a:p>
-                  </a:txBody>
-                  <a:tcPr marL="95250" marR="95250" marT="47625" marB="47625">
-                    <a:lnL w="6350" cap="flat" cmpd="sng" algn="ctr">
-                      <a:noFill/>
-                      <a:prstDash val="solid"/>
-                      <a:round/>
-                      <a:headEnd type="none" w="med" len="med"/>
-                      <a:tailEnd type="none" w="med" len="med"/>
-                    </a:lnL>
-                    <a:lnR w="6350" cap="flat" cmpd="sng" algn="ctr">
-                      <a:noFill/>
-                      <a:prstDash val="solid"/>
-                      <a:round/>
-                      <a:headEnd type="none" w="med" len="med"/>
-                      <a:tailEnd type="none" w="med" len="med"/>
-                    </a:lnR>
-                    <a:lnT w="6350" cap="flat" cmpd="sng" algn="ctr">
-                      <a:noFill/>
-                      <a:prstDash val="solid"/>
-                      <a:round/>
-                      <a:headEnd type="none" w="med" len="med"/>
-                      <a:tailEnd type="none" w="med" len="med"/>
-                    </a:lnT>
-                    <a:lnB w="6350" cap="flat" cmpd="sng" algn="ctr">
-                      <a:solidFill>
-                        <a:srgbClr val="707070"/>
-                      </a:solidFill>
-                      <a:prstDash val="solid"/>
-                      <a:round/>
-                      <a:headEnd type="none" w="med" len="med"/>
-                      <a:tailEnd type="none" w="med" len="med"/>
-                    </a:lnB>
-                    <a:lnTlToBr w="12700" cmpd="sng">
-                      <a:noFill/>
-                      <a:prstDash val="solid"/>
-                    </a:lnTlToBr>
-                    <a:lnBlToTr w="12700" cmpd="sng">
-                      <a:noFill/>
-                      <a:prstDash val="solid"/>
-                    </a:lnBlToTr>
-                    <a:noFill/>
-                  </a:tcPr>
-                </a:tc>
-                <a:extLst>
-                  <a:ext uri="{0D108BD9-81ED-4DB2-BD59-A6C34878D82A}">
-                    <a16:rowId xmlns="" xmlns:a16="http://schemas.microsoft.com/office/drawing/2014/main" val="10001"/>
-                  </a:ext>
-                </a:extLst>
-              </a:tr>
-              <a:tr h="370840">
-                <a:tc>
-                  <a:txBody>
-                    <a:bodyPr/>
-                    <a:lstStyle/>
-                    <a:p>
-                      <a:pPr algn="l" fontAlgn="t"/>
-                      <a:r>
-                        <a:rPr lang="en-US" sz="1000" b="1" dirty="0">
-                          <a:solidFill>
-                            <a:srgbClr val="707070"/>
-                          </a:solidFill>
-                          <a:effectLst/>
-                          <a:latin typeface="DIN-Regular"/>
-                        </a:rPr>
-                        <a:t>X-tee </a:t>
-                      </a:r>
-                      <a:r>
-                        <a:rPr lang="en-US" sz="1000" b="1" dirty="0" err="1">
-                          <a:solidFill>
-                            <a:srgbClr val="707070"/>
-                          </a:solidFill>
-                          <a:effectLst/>
-                          <a:latin typeface="DIN-Regular"/>
-                        </a:rPr>
-                        <a:t>allkiri</a:t>
-                      </a:r>
-                      <a:r>
-                        <a:rPr lang="et-EE" sz="1000" b="1" dirty="0">
-                          <a:solidFill>
-                            <a:srgbClr val="707070"/>
-                          </a:solidFill>
-                          <a:effectLst/>
-                          <a:latin typeface="DIN-Regular"/>
-                        </a:rPr>
-                        <a:t> (</a:t>
-                      </a:r>
-                      <a:r>
-                        <a:rPr lang="en-US" sz="1000" b="1" dirty="0" err="1">
-                          <a:solidFill>
-                            <a:srgbClr val="707070"/>
-                          </a:solidFill>
-                          <a:effectLst/>
-                          <a:latin typeface="DIN-Regular"/>
-                        </a:rPr>
-                        <a:t>lihtne</a:t>
-                      </a:r>
-                      <a:r>
-                        <a:rPr lang="en-US" sz="1000" b="1" baseline="0" dirty="0">
-                          <a:solidFill>
-                            <a:srgbClr val="707070"/>
-                          </a:solidFill>
-                          <a:effectLst/>
-                          <a:latin typeface="DIN-Regular"/>
-                        </a:rPr>
-                        <a:t> </a:t>
-                      </a:r>
-                      <a:r>
-                        <a:rPr lang="en-US" sz="1000" b="1" baseline="0" dirty="0" err="1">
-                          <a:solidFill>
-                            <a:srgbClr val="707070"/>
-                          </a:solidFill>
-                          <a:effectLst/>
-                          <a:latin typeface="DIN-Regular"/>
-                        </a:rPr>
-                        <a:t>formaat</a:t>
-                      </a:r>
-                      <a:r>
-                        <a:rPr lang="et-EE" sz="1000" b="1" dirty="0">
-                          <a:solidFill>
-                            <a:srgbClr val="707070"/>
-                          </a:solidFill>
-                          <a:effectLst/>
-                          <a:latin typeface="DIN-Regular"/>
-                        </a:rPr>
-                        <a:t>)</a:t>
-                      </a:r>
-                    </a:p>
-                  </a:txBody>
-                  <a:tcPr marL="95250" marR="95250" marT="47625" marB="47625">
-                    <a:lnL w="6350" cap="flat" cmpd="sng" algn="ctr">
-                      <a:noFill/>
-                      <a:prstDash val="solid"/>
-                      <a:round/>
-                      <a:headEnd type="none" w="med" len="med"/>
-                      <a:tailEnd type="none" w="med" len="med"/>
-                    </a:lnL>
-                    <a:lnR w="6350" cap="flat" cmpd="sng" algn="ctr">
-                      <a:noFill/>
-                      <a:prstDash val="solid"/>
-                      <a:round/>
-                      <a:headEnd type="none" w="med" len="med"/>
-                      <a:tailEnd type="none" w="med" len="med"/>
-                    </a:lnR>
-                    <a:lnT w="6350" cap="flat" cmpd="sng" algn="ctr">
-                      <a:solidFill>
-                        <a:srgbClr val="707070"/>
-                      </a:solidFill>
-                      <a:prstDash val="solid"/>
-                      <a:round/>
-                      <a:headEnd type="none" w="med" len="med"/>
-                      <a:tailEnd type="none" w="med" len="med"/>
-                    </a:lnT>
-                    <a:lnB w="6350" cap="flat" cmpd="sng" algn="ctr">
-                      <a:solidFill>
-                        <a:srgbClr val="707070"/>
-                      </a:solidFill>
-                      <a:prstDash val="solid"/>
-                      <a:round/>
-                      <a:headEnd type="none" w="med" len="med"/>
-                      <a:tailEnd type="none" w="med" len="med"/>
-                    </a:lnB>
-                    <a:lnTlToBr w="12700" cmpd="sng">
-                      <a:noFill/>
-                      <a:prstDash val="solid"/>
-                    </a:lnTlToBr>
-                    <a:lnBlToTr w="12700" cmpd="sng">
-                      <a:noFill/>
-                      <a:prstDash val="solid"/>
-                    </a:lnBlToTr>
-                    <a:noFill/>
-                  </a:tcPr>
-                </a:tc>
-                <a:tc>
-                  <a:txBody>
-                    <a:bodyPr/>
-                    <a:lstStyle/>
-                    <a:p>
-                      <a:pPr algn="l" fontAlgn="t"/>
-                      <a:r>
-                        <a:rPr lang="et-EE" sz="1000" b="0" dirty="0">
-                          <a:solidFill>
-                            <a:srgbClr val="707070"/>
-                          </a:solidFill>
-                          <a:effectLst/>
-                          <a:latin typeface="DIN-Regular"/>
-                        </a:rPr>
-                        <a:t>NOK</a:t>
-                      </a:r>
-                    </a:p>
-                  </a:txBody>
-                  <a:tcPr marL="95250" marR="95250" marT="47625" marB="47625">
-                    <a:lnL w="6350" cap="flat" cmpd="sng" algn="ctr">
-                      <a:noFill/>
-                      <a:prstDash val="solid"/>
-                      <a:round/>
-                      <a:headEnd type="none" w="med" len="med"/>
-                      <a:tailEnd type="none" w="med" len="med"/>
-                    </a:lnL>
-                    <a:lnR w="6350" cap="flat" cmpd="sng" algn="ctr">
-                      <a:noFill/>
-                      <a:prstDash val="solid"/>
-                      <a:round/>
-                      <a:headEnd type="none" w="med" len="med"/>
-                      <a:tailEnd type="none" w="med" len="med"/>
-                    </a:lnR>
-                    <a:lnT w="6350" cap="flat" cmpd="sng" algn="ctr">
-                      <a:solidFill>
-                        <a:srgbClr val="707070"/>
-                      </a:solidFill>
-                      <a:prstDash val="solid"/>
-                      <a:round/>
-                      <a:headEnd type="none" w="med" len="med"/>
-                      <a:tailEnd type="none" w="med" len="med"/>
-                    </a:lnT>
-                    <a:lnB w="6350" cap="flat" cmpd="sng" algn="ctr">
-                      <a:solidFill>
-                        <a:srgbClr val="707070"/>
-                      </a:solidFill>
-                      <a:prstDash val="solid"/>
-                      <a:round/>
-                      <a:headEnd type="none" w="med" len="med"/>
-                      <a:tailEnd type="none" w="med" len="med"/>
-                    </a:lnB>
-                    <a:lnTlToBr w="12700" cmpd="sng">
-                      <a:noFill/>
-                      <a:prstDash val="solid"/>
-                    </a:lnTlToBr>
-                    <a:lnBlToTr w="12700" cmpd="sng">
-                      <a:noFill/>
-                      <a:prstDash val="solid"/>
-                    </a:lnBlToTr>
-                    <a:noFill/>
-                  </a:tcPr>
-                </a:tc>
-                <a:tc>
-                  <a:txBody>
-                    <a:bodyPr/>
-                    <a:lstStyle/>
-                    <a:p>
-                      <a:pPr algn="l" fontAlgn="t"/>
-                      <a:r>
-                        <a:rPr lang="et-EE" sz="1000" b="0" dirty="0">
-                          <a:solidFill>
-                            <a:srgbClr val="707070"/>
-                          </a:solidFill>
-                          <a:effectLst/>
-                          <a:latin typeface="DIN-Regular"/>
-                        </a:rPr>
-                        <a:t>NOK</a:t>
-                      </a:r>
-                    </a:p>
-                  </a:txBody>
-                  <a:tcPr marL="95250" marR="95250" marT="47625" marB="47625">
-                    <a:lnL w="6350" cap="flat" cmpd="sng" algn="ctr">
-                      <a:noFill/>
-                      <a:prstDash val="solid"/>
-                      <a:round/>
-                      <a:headEnd type="none" w="med" len="med"/>
-                      <a:tailEnd type="none" w="med" len="med"/>
-                    </a:lnL>
-                    <a:lnR w="6350" cap="flat" cmpd="sng" algn="ctr">
-                      <a:noFill/>
-                      <a:prstDash val="solid"/>
-                      <a:round/>
-                      <a:headEnd type="none" w="med" len="med"/>
-                      <a:tailEnd type="none" w="med" len="med"/>
-                    </a:lnR>
-                    <a:lnT w="6350" cap="flat" cmpd="sng" algn="ctr">
-                      <a:solidFill>
-                        <a:srgbClr val="707070"/>
-                      </a:solidFill>
-                      <a:prstDash val="solid"/>
-                      <a:round/>
-                      <a:headEnd type="none" w="med" len="med"/>
-                      <a:tailEnd type="none" w="med" len="med"/>
-                    </a:lnT>
-                    <a:lnB w="6350" cap="flat" cmpd="sng" algn="ctr">
-                      <a:solidFill>
-                        <a:srgbClr val="707070"/>
-                      </a:solidFill>
-                      <a:prstDash val="solid"/>
-                      <a:round/>
-                      <a:headEnd type="none" w="med" len="med"/>
-                      <a:tailEnd type="none" w="med" len="med"/>
-                    </a:lnB>
-                    <a:lnTlToBr w="12700" cmpd="sng">
-                      <a:noFill/>
-                      <a:prstDash val="solid"/>
-                    </a:lnTlToBr>
-                    <a:lnBlToTr w="12700" cmpd="sng">
-                      <a:noFill/>
-                      <a:prstDash val="solid"/>
-                    </a:lnBlToTr>
-                    <a:noFill/>
-                  </a:tcPr>
-                </a:tc>
-                <a:tc>
-                  <a:txBody>
-                    <a:bodyPr/>
-                    <a:lstStyle/>
-                    <a:p>
-                      <a:pPr algn="l" fontAlgn="t"/>
-                      <a:r>
-                        <a:rPr lang="et-EE" sz="1000" b="0">
-                          <a:solidFill>
-                            <a:srgbClr val="707070"/>
-                          </a:solidFill>
-                          <a:effectLst/>
-                          <a:latin typeface="DIN-Regular"/>
-                        </a:rPr>
-                        <a:t>NOK</a:t>
-                      </a:r>
-                    </a:p>
-                  </a:txBody>
-                  <a:tcPr marL="95250" marR="95250" marT="47625" marB="47625">
-                    <a:lnL w="6350" cap="flat" cmpd="sng" algn="ctr">
-                      <a:noFill/>
-                      <a:prstDash val="solid"/>
-                      <a:round/>
-                      <a:headEnd type="none" w="med" len="med"/>
-                      <a:tailEnd type="none" w="med" len="med"/>
-                    </a:lnL>
-                    <a:lnR w="6350" cap="flat" cmpd="sng" algn="ctr">
-                      <a:noFill/>
-                      <a:prstDash val="solid"/>
-                      <a:round/>
-                      <a:headEnd type="none" w="med" len="med"/>
-                      <a:tailEnd type="none" w="med" len="med"/>
-                    </a:lnR>
-                    <a:lnT w="6350" cap="flat" cmpd="sng" algn="ctr">
-                      <a:solidFill>
-                        <a:srgbClr val="707070"/>
-                      </a:solidFill>
-                      <a:prstDash val="solid"/>
-                      <a:round/>
-                      <a:headEnd type="none" w="med" len="med"/>
-                      <a:tailEnd type="none" w="med" len="med"/>
-                    </a:lnT>
-                    <a:lnB w="6350" cap="flat" cmpd="sng" algn="ctr">
-                      <a:solidFill>
-                        <a:srgbClr val="707070"/>
-                      </a:solidFill>
-                      <a:prstDash val="solid"/>
-                      <a:round/>
-                      <a:headEnd type="none" w="med" len="med"/>
-                      <a:tailEnd type="none" w="med" len="med"/>
-                    </a:lnB>
-                    <a:lnTlToBr w="12700" cmpd="sng">
-                      <a:noFill/>
-                      <a:prstDash val="solid"/>
-                    </a:lnTlToBr>
-                    <a:lnBlToTr w="12700" cmpd="sng">
-                      <a:noFill/>
-                      <a:prstDash val="solid"/>
-                    </a:lnBlToTr>
-                    <a:noFill/>
-                  </a:tcPr>
-                </a:tc>
-                <a:tc>
-                  <a:txBody>
-                    <a:bodyPr/>
-                    <a:lstStyle/>
-                    <a:p>
-                      <a:pPr algn="l" fontAlgn="t"/>
-                      <a:r>
-                        <a:rPr lang="et-EE" sz="1000" b="0">
-                          <a:solidFill>
-                            <a:srgbClr val="707070"/>
-                          </a:solidFill>
-                          <a:effectLst/>
-                          <a:latin typeface="DIN-Regular"/>
-                        </a:rPr>
-                        <a:t>OK</a:t>
-                      </a:r>
-                    </a:p>
-                  </a:txBody>
-                  <a:tcPr marL="95250" marR="95250" marT="47625" marB="47625">
-                    <a:lnL w="6350" cap="flat" cmpd="sng" algn="ctr">
-                      <a:noFill/>
-                      <a:prstDash val="solid"/>
-                      <a:round/>
-                      <a:headEnd type="none" w="med" len="med"/>
-                      <a:tailEnd type="none" w="med" len="med"/>
-                    </a:lnL>
-                    <a:lnR w="6350" cap="flat" cmpd="sng" algn="ctr">
-                      <a:noFill/>
-                      <a:prstDash val="solid"/>
-                      <a:round/>
-                      <a:headEnd type="none" w="med" len="med"/>
-                      <a:tailEnd type="none" w="med" len="med"/>
-                    </a:lnR>
-                    <a:lnT w="6350" cap="flat" cmpd="sng" algn="ctr">
-                      <a:solidFill>
-                        <a:srgbClr val="707070"/>
-                      </a:solidFill>
-                      <a:prstDash val="solid"/>
-                      <a:round/>
-                      <a:headEnd type="none" w="med" len="med"/>
-                      <a:tailEnd type="none" w="med" len="med"/>
-                    </a:lnT>
-                    <a:lnB w="6350" cap="flat" cmpd="sng" algn="ctr">
-                      <a:solidFill>
-                        <a:srgbClr val="707070"/>
-                      </a:solidFill>
-                      <a:prstDash val="solid"/>
-                      <a:round/>
-                      <a:headEnd type="none" w="med" len="med"/>
-                      <a:tailEnd type="none" w="med" len="med"/>
-                    </a:lnB>
-                    <a:lnTlToBr w="12700" cmpd="sng">
-                      <a:noFill/>
-                      <a:prstDash val="solid"/>
-                    </a:lnTlToBr>
-                    <a:lnBlToTr w="12700" cmpd="sng">
-                      <a:noFill/>
-                      <a:prstDash val="solid"/>
-                    </a:lnBlToTr>
-                    <a:noFill/>
-                  </a:tcPr>
-                </a:tc>
-                <a:tc>
-                  <a:txBody>
-                    <a:bodyPr/>
-                    <a:lstStyle/>
-                    <a:p>
-                      <a:pPr algn="l" fontAlgn="t"/>
-                      <a:r>
-                        <a:rPr lang="et-EE" sz="1000" b="0">
-                          <a:solidFill>
-                            <a:srgbClr val="707070"/>
-                          </a:solidFill>
-                          <a:effectLst/>
-                          <a:latin typeface="DIN-Regular"/>
-                        </a:rPr>
-                        <a:t>NOK</a:t>
-                      </a:r>
-                    </a:p>
-                  </a:txBody>
-                  <a:tcPr marL="95250" marR="95250" marT="47625" marB="47625">
-                    <a:lnL w="6350" cap="flat" cmpd="sng" algn="ctr">
-                      <a:noFill/>
-                      <a:prstDash val="solid"/>
-                      <a:round/>
-                      <a:headEnd type="none" w="med" len="med"/>
-                      <a:tailEnd type="none" w="med" len="med"/>
-                    </a:lnL>
-                    <a:lnR w="6350" cap="flat" cmpd="sng" algn="ctr">
-                      <a:noFill/>
-                      <a:prstDash val="solid"/>
-                      <a:round/>
-                      <a:headEnd type="none" w="med" len="med"/>
-                      <a:tailEnd type="none" w="med" len="med"/>
-                    </a:lnR>
-                    <a:lnT w="6350" cap="flat" cmpd="sng" algn="ctr">
-                      <a:solidFill>
-                        <a:srgbClr val="707070"/>
-                      </a:solidFill>
-                      <a:prstDash val="solid"/>
-                      <a:round/>
-                      <a:headEnd type="none" w="med" len="med"/>
-                      <a:tailEnd type="none" w="med" len="med"/>
-                    </a:lnT>
-                    <a:lnB w="6350" cap="flat" cmpd="sng" algn="ctr">
-                      <a:solidFill>
-                        <a:srgbClr val="707070"/>
-                      </a:solidFill>
-                      <a:prstDash val="solid"/>
-                      <a:round/>
-                      <a:headEnd type="none" w="med" len="med"/>
-                      <a:tailEnd type="none" w="med" len="med"/>
-                    </a:lnB>
-                    <a:lnTlToBr w="12700" cmpd="sng">
-                      <a:noFill/>
-                      <a:prstDash val="solid"/>
-                    </a:lnTlToBr>
-                    <a:lnBlToTr w="12700" cmpd="sng">
-                      <a:noFill/>
-                      <a:prstDash val="solid"/>
-                    </a:lnBlToTr>
-                    <a:noFill/>
-                  </a:tcPr>
-                </a:tc>
-                <a:tc>
-                  <a:txBody>
-                    <a:bodyPr/>
-                    <a:lstStyle/>
-                    <a:p>
-                      <a:pPr algn="l" fontAlgn="t"/>
-                      <a:r>
-                        <a:rPr lang="et-EE" sz="1000" b="0" dirty="0">
-                          <a:solidFill>
-                            <a:srgbClr val="707070"/>
-                          </a:solidFill>
-                          <a:effectLst/>
-                          <a:latin typeface="DIN-Regular"/>
-                        </a:rPr>
-                        <a:t>NOK</a:t>
-                      </a:r>
-                    </a:p>
-                  </a:txBody>
-                  <a:tcPr marL="95250" marR="95250" marT="47625" marB="47625">
-                    <a:lnL w="6350" cap="flat" cmpd="sng" algn="ctr">
-                      <a:noFill/>
-                      <a:prstDash val="solid"/>
-                      <a:round/>
-                      <a:headEnd type="none" w="med" len="med"/>
-                      <a:tailEnd type="none" w="med" len="med"/>
-                    </a:lnL>
-                    <a:lnR w="6350" cap="flat" cmpd="sng" algn="ctr">
-                      <a:noFill/>
-                      <a:prstDash val="solid"/>
-                      <a:round/>
-                      <a:headEnd type="none" w="med" len="med"/>
-                      <a:tailEnd type="none" w="med" len="med"/>
-                    </a:lnR>
-                    <a:lnT w="6350" cap="flat" cmpd="sng" algn="ctr">
-                      <a:solidFill>
-                        <a:srgbClr val="707070"/>
-                      </a:solidFill>
-                      <a:prstDash val="solid"/>
-                      <a:round/>
-                      <a:headEnd type="none" w="med" len="med"/>
-                      <a:tailEnd type="none" w="med" len="med"/>
-                    </a:lnT>
-                    <a:lnB w="6350" cap="flat" cmpd="sng" algn="ctr">
-                      <a:solidFill>
-                        <a:srgbClr val="707070"/>
-                      </a:solidFill>
-                      <a:prstDash val="solid"/>
-                      <a:round/>
-                      <a:headEnd type="none" w="med" len="med"/>
-                      <a:tailEnd type="none" w="med" len="med"/>
-                    </a:lnB>
-                    <a:lnTlToBr w="12700" cmpd="sng">
-                      <a:noFill/>
-                      <a:prstDash val="solid"/>
-                    </a:lnTlToBr>
-                    <a:lnBlToTr w="12700" cmpd="sng">
-                      <a:noFill/>
-                      <a:prstDash val="solid"/>
-                    </a:lnBlToTr>
-                    <a:noFill/>
-                  </a:tcPr>
-                </a:tc>
-                <a:extLst>
-                  <a:ext uri="{0D108BD9-81ED-4DB2-BD59-A6C34878D82A}">
-                    <a16:rowId xmlns="" xmlns:a16="http://schemas.microsoft.com/office/drawing/2014/main" val="10002"/>
-                  </a:ext>
-                </a:extLst>
-              </a:tr>
-              <a:tr h="370840">
-                <a:tc>
-                  <a:txBody>
-                    <a:bodyPr/>
-                    <a:lstStyle/>
-                    <a:p>
-                      <a:pPr algn="l" fontAlgn="t"/>
-                      <a:r>
-                        <a:rPr lang="et-EE" sz="1000" b="1" dirty="0">
-                          <a:solidFill>
-                            <a:srgbClr val="707070"/>
-                          </a:solidFill>
-                          <a:effectLst/>
-                          <a:latin typeface="DIN-Regular"/>
-                        </a:rPr>
-                        <a:t>X-</a:t>
-                      </a:r>
-                      <a:r>
-                        <a:rPr lang="en-US" sz="1000" b="1" dirty="0">
-                          <a:solidFill>
-                            <a:srgbClr val="707070"/>
-                          </a:solidFill>
-                          <a:effectLst/>
-                          <a:latin typeface="DIN-Regular"/>
-                        </a:rPr>
-                        <a:t>tee</a:t>
-                      </a:r>
-                      <a:r>
-                        <a:rPr lang="et-EE" sz="1000" b="1" dirty="0">
-                          <a:solidFill>
-                            <a:srgbClr val="707070"/>
-                          </a:solidFill>
-                          <a:effectLst/>
-                          <a:latin typeface="DIN-Regular"/>
-                        </a:rPr>
-                        <a:t> </a:t>
-                      </a:r>
-                      <a:r>
-                        <a:rPr lang="en-US" sz="1000" b="1" dirty="0" err="1">
-                          <a:solidFill>
-                            <a:srgbClr val="707070"/>
-                          </a:solidFill>
-                          <a:effectLst/>
-                          <a:latin typeface="DIN-Regular"/>
-                        </a:rPr>
-                        <a:t>allkiri</a:t>
-                      </a:r>
-                      <a:r>
-                        <a:rPr lang="et-EE" sz="1000" b="1" dirty="0">
-                          <a:solidFill>
-                            <a:srgbClr val="707070"/>
-                          </a:solidFill>
-                          <a:effectLst/>
-                          <a:latin typeface="DIN-Regular"/>
-                        </a:rPr>
-                        <a:t> (</a:t>
-                      </a:r>
-                      <a:r>
-                        <a:rPr lang="et-EE" sz="1000" b="1" i="1" dirty="0" err="1">
-                          <a:solidFill>
-                            <a:srgbClr val="707070"/>
-                          </a:solidFill>
-                          <a:effectLst/>
-                          <a:latin typeface="DIN-Regular"/>
-                        </a:rPr>
-                        <a:t>batch</a:t>
-                      </a:r>
-                      <a:r>
-                        <a:rPr lang="et-EE" sz="1000" b="1" dirty="0">
-                          <a:solidFill>
-                            <a:srgbClr val="707070"/>
-                          </a:solidFill>
-                          <a:effectLst/>
-                          <a:latin typeface="DIN-Regular"/>
-                        </a:rPr>
-                        <a:t> </a:t>
-                      </a:r>
-                      <a:r>
-                        <a:rPr lang="en-US" sz="1000" b="1" dirty="0" err="1">
-                          <a:solidFill>
-                            <a:srgbClr val="707070"/>
-                          </a:solidFill>
-                          <a:effectLst/>
-                          <a:latin typeface="DIN-Regular"/>
-                        </a:rPr>
-                        <a:t>allkiri</a:t>
-                      </a:r>
-                      <a:r>
-                        <a:rPr lang="et-EE" sz="1000" b="1" dirty="0">
-                          <a:solidFill>
-                            <a:srgbClr val="707070"/>
-                          </a:solidFill>
-                          <a:effectLst/>
-                          <a:latin typeface="DIN-Regular"/>
-                        </a:rPr>
-                        <a:t>)</a:t>
-                      </a:r>
-                    </a:p>
-                  </a:txBody>
-                  <a:tcPr marL="95250" marR="95250" marT="47625" marB="47625">
-                    <a:lnL w="6350" cap="flat" cmpd="sng" algn="ctr">
-                      <a:noFill/>
-                      <a:prstDash val="solid"/>
-                      <a:round/>
-                      <a:headEnd type="none" w="med" len="med"/>
-                      <a:tailEnd type="none" w="med" len="med"/>
-                    </a:lnL>
-                    <a:lnR w="6350" cap="flat" cmpd="sng" algn="ctr">
-                      <a:noFill/>
-                      <a:prstDash val="solid"/>
-                      <a:round/>
-                      <a:headEnd type="none" w="med" len="med"/>
-                      <a:tailEnd type="none" w="med" len="med"/>
-                    </a:lnR>
-                    <a:lnT w="6350" cap="flat" cmpd="sng" algn="ctr">
-                      <a:solidFill>
-                        <a:srgbClr val="707070"/>
-                      </a:solidFill>
-                      <a:prstDash val="solid"/>
-                      <a:round/>
-                      <a:headEnd type="none" w="med" len="med"/>
-                      <a:tailEnd type="none" w="med" len="med"/>
-                    </a:lnT>
-                    <a:lnB w="6350" cap="flat" cmpd="sng" algn="ctr">
-                      <a:solidFill>
-                        <a:srgbClr val="707070"/>
-                      </a:solidFill>
-                      <a:prstDash val="solid"/>
-                      <a:round/>
-                      <a:headEnd type="none" w="med" len="med"/>
-                      <a:tailEnd type="none" w="med" len="med"/>
-                    </a:lnB>
-                    <a:lnTlToBr w="12700" cmpd="sng">
-                      <a:noFill/>
-                      <a:prstDash val="solid"/>
-                    </a:lnTlToBr>
-                    <a:lnBlToTr w="12700" cmpd="sng">
-                      <a:noFill/>
-                      <a:prstDash val="solid"/>
-                    </a:lnBlToTr>
-                    <a:noFill/>
-                  </a:tcPr>
-                </a:tc>
-                <a:tc>
-                  <a:txBody>
-                    <a:bodyPr/>
-                    <a:lstStyle/>
-                    <a:p>
-                      <a:pPr algn="l" fontAlgn="t"/>
-                      <a:r>
-                        <a:rPr lang="et-EE" sz="1000" b="0" dirty="0">
-                          <a:solidFill>
-                            <a:srgbClr val="707070"/>
-                          </a:solidFill>
-                          <a:effectLst/>
-                          <a:latin typeface="DIN-Regular"/>
-                        </a:rPr>
-                        <a:t>OK</a:t>
-                      </a:r>
-                    </a:p>
-                  </a:txBody>
-                  <a:tcPr marL="95250" marR="95250" marT="47625" marB="47625">
-                    <a:lnL w="6350" cap="flat" cmpd="sng" algn="ctr">
-                      <a:noFill/>
-                      <a:prstDash val="solid"/>
-                      <a:round/>
-                      <a:headEnd type="none" w="med" len="med"/>
-                      <a:tailEnd type="none" w="med" len="med"/>
-                    </a:lnL>
-                    <a:lnR w="6350" cap="flat" cmpd="sng" algn="ctr">
-                      <a:noFill/>
-                      <a:prstDash val="solid"/>
-                      <a:round/>
-                      <a:headEnd type="none" w="med" len="med"/>
-                      <a:tailEnd type="none" w="med" len="med"/>
-                    </a:lnR>
-                    <a:lnT w="6350" cap="flat" cmpd="sng" algn="ctr">
-                      <a:solidFill>
-                        <a:srgbClr val="707070"/>
-                      </a:solidFill>
-                      <a:prstDash val="solid"/>
-                      <a:round/>
-                      <a:headEnd type="none" w="med" len="med"/>
-                      <a:tailEnd type="none" w="med" len="med"/>
-                    </a:lnT>
-                    <a:lnB w="6350" cap="flat" cmpd="sng" algn="ctr">
-                      <a:solidFill>
-                        <a:srgbClr val="707070"/>
-                      </a:solidFill>
-                      <a:prstDash val="solid"/>
-                      <a:round/>
-                      <a:headEnd type="none" w="med" len="med"/>
-                      <a:tailEnd type="none" w="med" len="med"/>
-                    </a:lnB>
-                    <a:lnTlToBr w="12700" cmpd="sng">
-                      <a:noFill/>
-                      <a:prstDash val="solid"/>
-                    </a:lnTlToBr>
-                    <a:lnBlToTr w="12700" cmpd="sng">
-                      <a:noFill/>
-                      <a:prstDash val="solid"/>
-                    </a:lnBlToTr>
-                    <a:noFill/>
-                  </a:tcPr>
-                </a:tc>
-                <a:tc>
-                  <a:txBody>
-                    <a:bodyPr/>
-                    <a:lstStyle/>
-                    <a:p>
-                      <a:pPr algn="l" fontAlgn="t"/>
-                      <a:r>
-                        <a:rPr lang="et-EE" sz="1000" b="0" dirty="0">
-                          <a:solidFill>
-                            <a:srgbClr val="707070"/>
-                          </a:solidFill>
-                          <a:effectLst/>
-                          <a:latin typeface="DIN-Regular"/>
-                        </a:rPr>
-                        <a:t>OK</a:t>
-                      </a:r>
-                    </a:p>
-                  </a:txBody>
-                  <a:tcPr marL="95250" marR="95250" marT="47625" marB="47625">
-                    <a:lnL w="6350" cap="flat" cmpd="sng" algn="ctr">
-                      <a:noFill/>
-                      <a:prstDash val="solid"/>
-                      <a:round/>
-                      <a:headEnd type="none" w="med" len="med"/>
-                      <a:tailEnd type="none" w="med" len="med"/>
-                    </a:lnL>
-                    <a:lnR w="6350" cap="flat" cmpd="sng" algn="ctr">
-                      <a:noFill/>
-                      <a:prstDash val="solid"/>
-                      <a:round/>
-                      <a:headEnd type="none" w="med" len="med"/>
-                      <a:tailEnd type="none" w="med" len="med"/>
-                    </a:lnR>
-                    <a:lnT w="6350" cap="flat" cmpd="sng" algn="ctr">
-                      <a:solidFill>
-                        <a:srgbClr val="707070"/>
-                      </a:solidFill>
-                      <a:prstDash val="solid"/>
-                      <a:round/>
-                      <a:headEnd type="none" w="med" len="med"/>
-                      <a:tailEnd type="none" w="med" len="med"/>
-                    </a:lnT>
-                    <a:lnB w="6350" cap="flat" cmpd="sng" algn="ctr">
-                      <a:solidFill>
-                        <a:srgbClr val="707070"/>
-                      </a:solidFill>
-                      <a:prstDash val="solid"/>
-                      <a:round/>
-                      <a:headEnd type="none" w="med" len="med"/>
-                      <a:tailEnd type="none" w="med" len="med"/>
-                    </a:lnB>
-                    <a:lnTlToBr w="12700" cmpd="sng">
-                      <a:noFill/>
-                      <a:prstDash val="solid"/>
-                    </a:lnTlToBr>
-                    <a:lnBlToTr w="12700" cmpd="sng">
-                      <a:noFill/>
-                      <a:prstDash val="solid"/>
-                    </a:lnBlToTr>
-                    <a:noFill/>
-                  </a:tcPr>
-                </a:tc>
-                <a:tc>
-                  <a:txBody>
-                    <a:bodyPr/>
-                    <a:lstStyle/>
-                    <a:p>
-                      <a:pPr algn="l" fontAlgn="t"/>
-                      <a:r>
-                        <a:rPr lang="et-EE" sz="1000" b="0" dirty="0">
-                          <a:solidFill>
-                            <a:srgbClr val="707070"/>
-                          </a:solidFill>
-                          <a:effectLst/>
-                          <a:latin typeface="DIN-Regular"/>
-                        </a:rPr>
-                        <a:t>NOK</a:t>
-                      </a:r>
-                    </a:p>
-                  </a:txBody>
-                  <a:tcPr marL="95250" marR="95250" marT="47625" marB="47625">
-                    <a:lnL w="6350" cap="flat" cmpd="sng" algn="ctr">
-                      <a:noFill/>
-                      <a:prstDash val="solid"/>
-                      <a:round/>
-                      <a:headEnd type="none" w="med" len="med"/>
-                      <a:tailEnd type="none" w="med" len="med"/>
-                    </a:lnL>
-                    <a:lnR w="6350" cap="flat" cmpd="sng" algn="ctr">
-                      <a:noFill/>
-                      <a:prstDash val="solid"/>
-                      <a:round/>
-                      <a:headEnd type="none" w="med" len="med"/>
-                      <a:tailEnd type="none" w="med" len="med"/>
-                    </a:lnR>
-                    <a:lnT w="6350" cap="flat" cmpd="sng" algn="ctr">
-                      <a:solidFill>
-                        <a:srgbClr val="707070"/>
-                      </a:solidFill>
-                      <a:prstDash val="solid"/>
-                      <a:round/>
-                      <a:headEnd type="none" w="med" len="med"/>
-                      <a:tailEnd type="none" w="med" len="med"/>
-                    </a:lnT>
-                    <a:lnB w="6350" cap="flat" cmpd="sng" algn="ctr">
-                      <a:solidFill>
-                        <a:srgbClr val="707070"/>
-                      </a:solidFill>
-                      <a:prstDash val="solid"/>
-                      <a:round/>
-                      <a:headEnd type="none" w="med" len="med"/>
-                      <a:tailEnd type="none" w="med" len="med"/>
-                    </a:lnB>
-                    <a:lnTlToBr w="12700" cmpd="sng">
-                      <a:noFill/>
-                      <a:prstDash val="solid"/>
-                    </a:lnTlToBr>
-                    <a:lnBlToTr w="12700" cmpd="sng">
-                      <a:noFill/>
-                      <a:prstDash val="solid"/>
-                    </a:lnBlToTr>
-                    <a:noFill/>
-                  </a:tcPr>
-                </a:tc>
-                <a:tc>
-                  <a:txBody>
-                    <a:bodyPr/>
-                    <a:lstStyle/>
-                    <a:p>
-                      <a:pPr algn="l" fontAlgn="t"/>
-                      <a:r>
-                        <a:rPr lang="et-EE" sz="1000" b="0" dirty="0">
-                          <a:solidFill>
-                            <a:srgbClr val="707070"/>
-                          </a:solidFill>
-                          <a:effectLst/>
-                          <a:latin typeface="DIN-Regular"/>
-                        </a:rPr>
-                        <a:t>NOK</a:t>
-                      </a:r>
-                    </a:p>
-                  </a:txBody>
-                  <a:tcPr marL="95250" marR="95250" marT="47625" marB="47625">
-                    <a:lnL w="6350" cap="flat" cmpd="sng" algn="ctr">
-                      <a:noFill/>
-                      <a:prstDash val="solid"/>
-                      <a:round/>
-                      <a:headEnd type="none" w="med" len="med"/>
-                      <a:tailEnd type="none" w="med" len="med"/>
-                    </a:lnL>
-                    <a:lnR w="6350" cap="flat" cmpd="sng" algn="ctr">
-                      <a:noFill/>
-                      <a:prstDash val="solid"/>
-                      <a:round/>
-                      <a:headEnd type="none" w="med" len="med"/>
-                      <a:tailEnd type="none" w="med" len="med"/>
-                    </a:lnR>
-                    <a:lnT w="6350" cap="flat" cmpd="sng" algn="ctr">
-                      <a:solidFill>
-                        <a:srgbClr val="707070"/>
-                      </a:solidFill>
-                      <a:prstDash val="solid"/>
-                      <a:round/>
-                      <a:headEnd type="none" w="med" len="med"/>
-                      <a:tailEnd type="none" w="med" len="med"/>
-                    </a:lnT>
-                    <a:lnB w="6350" cap="flat" cmpd="sng" algn="ctr">
-                      <a:solidFill>
-                        <a:srgbClr val="707070"/>
-                      </a:solidFill>
-                      <a:prstDash val="solid"/>
-                      <a:round/>
-                      <a:headEnd type="none" w="med" len="med"/>
-                      <a:tailEnd type="none" w="med" len="med"/>
-                    </a:lnB>
-                    <a:lnTlToBr w="12700" cmpd="sng">
-                      <a:noFill/>
-                      <a:prstDash val="solid"/>
-                    </a:lnTlToBr>
-                    <a:lnBlToTr w="12700" cmpd="sng">
-                      <a:noFill/>
-                      <a:prstDash val="solid"/>
-                    </a:lnBlToTr>
-                    <a:noFill/>
-                  </a:tcPr>
-                </a:tc>
-                <a:tc>
-                  <a:txBody>
-                    <a:bodyPr/>
-                    <a:lstStyle/>
-                    <a:p>
-                      <a:pPr algn="l" fontAlgn="t"/>
-                      <a:r>
-                        <a:rPr lang="et-EE" sz="1000" b="0" dirty="0">
-                          <a:solidFill>
-                            <a:srgbClr val="707070"/>
-                          </a:solidFill>
-                          <a:effectLst/>
-                          <a:latin typeface="DIN-Regular"/>
-                        </a:rPr>
-                        <a:t>NOK</a:t>
-                      </a:r>
-                    </a:p>
-                  </a:txBody>
-                  <a:tcPr marL="95250" marR="95250" marT="47625" marB="47625">
-                    <a:lnL w="6350" cap="flat" cmpd="sng" algn="ctr">
-                      <a:noFill/>
-                      <a:prstDash val="solid"/>
-                      <a:round/>
-                      <a:headEnd type="none" w="med" len="med"/>
-                      <a:tailEnd type="none" w="med" len="med"/>
-                    </a:lnL>
-                    <a:lnR w="6350" cap="flat" cmpd="sng" algn="ctr">
-                      <a:noFill/>
-                      <a:prstDash val="solid"/>
-                      <a:round/>
-                      <a:headEnd type="none" w="med" len="med"/>
-                      <a:tailEnd type="none" w="med" len="med"/>
-                    </a:lnR>
-                    <a:lnT w="6350" cap="flat" cmpd="sng" algn="ctr">
-                      <a:solidFill>
-                        <a:srgbClr val="707070"/>
-                      </a:solidFill>
-                      <a:prstDash val="solid"/>
-                      <a:round/>
-                      <a:headEnd type="none" w="med" len="med"/>
-                      <a:tailEnd type="none" w="med" len="med"/>
-                    </a:lnT>
-                    <a:lnB w="6350" cap="flat" cmpd="sng" algn="ctr">
-                      <a:solidFill>
-                        <a:srgbClr val="707070"/>
-                      </a:solidFill>
-                      <a:prstDash val="solid"/>
-                      <a:round/>
-                      <a:headEnd type="none" w="med" len="med"/>
-                      <a:tailEnd type="none" w="med" len="med"/>
-                    </a:lnB>
-                    <a:lnTlToBr w="12700" cmpd="sng">
-                      <a:noFill/>
-                      <a:prstDash val="solid"/>
-                    </a:lnTlToBr>
-                    <a:lnBlToTr w="12700" cmpd="sng">
-                      <a:noFill/>
-                      <a:prstDash val="solid"/>
-                    </a:lnBlToTr>
-                    <a:noFill/>
-                  </a:tcPr>
-                </a:tc>
-                <a:tc>
-                  <a:txBody>
-                    <a:bodyPr/>
-                    <a:lstStyle/>
-                    <a:p>
-                      <a:pPr algn="l" fontAlgn="t"/>
-                      <a:r>
-                        <a:rPr lang="et-EE" sz="1000" b="0" dirty="0">
-                          <a:solidFill>
-                            <a:srgbClr val="707070"/>
-                          </a:solidFill>
-                          <a:effectLst/>
-                          <a:latin typeface="DIN-Regular"/>
-                        </a:rPr>
-                        <a:t>NOK</a:t>
-                      </a:r>
-                    </a:p>
-                  </a:txBody>
-                  <a:tcPr marL="95250" marR="95250" marT="47625" marB="47625">
-                    <a:lnL w="6350" cap="flat" cmpd="sng" algn="ctr">
-                      <a:noFill/>
-                      <a:prstDash val="solid"/>
-                      <a:round/>
-                      <a:headEnd type="none" w="med" len="med"/>
-                      <a:tailEnd type="none" w="med" len="med"/>
-                    </a:lnL>
-                    <a:lnR w="6350" cap="flat" cmpd="sng" algn="ctr">
-                      <a:noFill/>
-                      <a:prstDash val="solid"/>
-                      <a:round/>
-                      <a:headEnd type="none" w="med" len="med"/>
-                      <a:tailEnd type="none" w="med" len="med"/>
-                    </a:lnR>
-                    <a:lnT w="6350" cap="flat" cmpd="sng" algn="ctr">
-                      <a:solidFill>
-                        <a:srgbClr val="707070"/>
-                      </a:solidFill>
-                      <a:prstDash val="solid"/>
-                      <a:round/>
-                      <a:headEnd type="none" w="med" len="med"/>
-                      <a:tailEnd type="none" w="med" len="med"/>
-                    </a:lnT>
-                    <a:lnB w="6350" cap="flat" cmpd="sng" algn="ctr">
-                      <a:solidFill>
-                        <a:srgbClr val="707070"/>
-                      </a:solidFill>
-                      <a:prstDash val="solid"/>
-                      <a:round/>
-                      <a:headEnd type="none" w="med" len="med"/>
-                      <a:tailEnd type="none" w="med" len="med"/>
-                    </a:lnB>
-                    <a:lnTlToBr w="12700" cmpd="sng">
-                      <a:noFill/>
-                      <a:prstDash val="solid"/>
-                    </a:lnTlToBr>
-                    <a:lnBlToTr w="12700" cmpd="sng">
-                      <a:noFill/>
-                      <a:prstDash val="solid"/>
-                    </a:lnBlToTr>
-                    <a:noFill/>
-                  </a:tcPr>
-                </a:tc>
-                <a:extLst>
-                  <a:ext uri="{0D108BD9-81ED-4DB2-BD59-A6C34878D82A}">
-                    <a16:rowId xmlns="" xmlns:a16="http://schemas.microsoft.com/office/drawing/2014/main" val="10003"/>
-                  </a:ext>
-                </a:extLst>
-              </a:tr>
-              <a:tr h="370840">
-                <a:tc>
-                  <a:txBody>
-                    <a:bodyPr/>
-                    <a:lstStyle/>
-                    <a:p>
-                      <a:pPr algn="l" fontAlgn="t"/>
-                      <a:r>
-                        <a:rPr lang="et-EE" sz="1000" b="1" dirty="0" err="1">
-                          <a:solidFill>
-                            <a:srgbClr val="707070"/>
-                          </a:solidFill>
-                          <a:effectLst/>
-                          <a:latin typeface="DIN-Regular"/>
-                        </a:rPr>
-                        <a:t>PAdES</a:t>
-                      </a:r>
-                      <a:endParaRPr lang="et-EE" sz="1000" b="1" dirty="0">
-                        <a:solidFill>
-                          <a:srgbClr val="707070"/>
-                        </a:solidFill>
-                        <a:effectLst/>
-                        <a:latin typeface="DIN-Regular"/>
-                      </a:endParaRPr>
-                    </a:p>
-                  </a:txBody>
-                  <a:tcPr marL="95250" marR="95250" marT="47625" marB="47625">
-                    <a:lnL w="6350" cap="flat" cmpd="sng" algn="ctr">
-                      <a:noFill/>
-                      <a:prstDash val="solid"/>
-                      <a:round/>
-                      <a:headEnd type="none" w="med" len="med"/>
-                      <a:tailEnd type="none" w="med" len="med"/>
-                    </a:lnL>
-                    <a:lnR w="6350" cap="flat" cmpd="sng" algn="ctr">
-                      <a:noFill/>
-                      <a:prstDash val="solid"/>
-                      <a:round/>
-                      <a:headEnd type="none" w="med" len="med"/>
-                      <a:tailEnd type="none" w="med" len="med"/>
-                    </a:lnR>
-                    <a:lnT w="6350" cap="flat" cmpd="sng" algn="ctr">
-                      <a:solidFill>
-                        <a:srgbClr val="707070"/>
-                      </a:solidFill>
-                      <a:prstDash val="solid"/>
-                      <a:round/>
-                      <a:headEnd type="none" w="med" len="med"/>
-                      <a:tailEnd type="none" w="med" len="med"/>
-                    </a:lnT>
-                    <a:lnB w="6350" cap="flat" cmpd="sng" algn="ctr">
-                      <a:solidFill>
-                        <a:srgbClr val="707070"/>
-                      </a:solidFill>
-                      <a:prstDash val="solid"/>
-                      <a:round/>
-                      <a:headEnd type="none" w="med" len="med"/>
-                      <a:tailEnd type="none" w="med" len="med"/>
-                    </a:lnB>
-                    <a:lnTlToBr w="12700" cmpd="sng">
-                      <a:noFill/>
-                      <a:prstDash val="solid"/>
-                    </a:lnTlToBr>
-                    <a:lnBlToTr w="12700" cmpd="sng">
-                      <a:noFill/>
-                      <a:prstDash val="solid"/>
-                    </a:lnBlToTr>
-                    <a:noFill/>
-                  </a:tcPr>
-                </a:tc>
-                <a:tc>
-                  <a:txBody>
-                    <a:bodyPr/>
-                    <a:lstStyle/>
-                    <a:p>
-                      <a:pPr algn="l" fontAlgn="t"/>
-                      <a:r>
-                        <a:rPr lang="et-EE" sz="1000" b="0" dirty="0">
-                          <a:solidFill>
-                            <a:srgbClr val="707070"/>
-                          </a:solidFill>
-                          <a:effectLst/>
-                          <a:latin typeface="DIN-Regular"/>
-                        </a:rPr>
-                        <a:t>NOK</a:t>
-                      </a:r>
-                    </a:p>
-                  </a:txBody>
-                  <a:tcPr marL="95250" marR="95250" marT="47625" marB="47625">
-                    <a:lnL w="6350" cap="flat" cmpd="sng" algn="ctr">
-                      <a:noFill/>
-                      <a:prstDash val="solid"/>
-                      <a:round/>
-                      <a:headEnd type="none" w="med" len="med"/>
-                      <a:tailEnd type="none" w="med" len="med"/>
-                    </a:lnL>
-                    <a:lnR w="6350" cap="flat" cmpd="sng" algn="ctr">
-                      <a:noFill/>
-                      <a:prstDash val="solid"/>
-                      <a:round/>
-                      <a:headEnd type="none" w="med" len="med"/>
-                      <a:tailEnd type="none" w="med" len="med"/>
-                    </a:lnR>
-                    <a:lnT w="6350" cap="flat" cmpd="sng" algn="ctr">
-                      <a:solidFill>
-                        <a:srgbClr val="707070"/>
-                      </a:solidFill>
-                      <a:prstDash val="solid"/>
-                      <a:round/>
-                      <a:headEnd type="none" w="med" len="med"/>
-                      <a:tailEnd type="none" w="med" len="med"/>
-                    </a:lnT>
-                    <a:lnB w="6350" cap="flat" cmpd="sng" algn="ctr">
-                      <a:solidFill>
-                        <a:srgbClr val="707070"/>
-                      </a:solidFill>
-                      <a:prstDash val="solid"/>
-                      <a:round/>
-                      <a:headEnd type="none" w="med" len="med"/>
-                      <a:tailEnd type="none" w="med" len="med"/>
-                    </a:lnB>
-                    <a:lnTlToBr w="12700" cmpd="sng">
-                      <a:noFill/>
-                      <a:prstDash val="solid"/>
-                    </a:lnTlToBr>
-                    <a:lnBlToTr w="12700" cmpd="sng">
-                      <a:noFill/>
-                      <a:prstDash val="solid"/>
-                    </a:lnBlToTr>
-                    <a:noFill/>
-                  </a:tcPr>
-                </a:tc>
-                <a:tc>
-                  <a:txBody>
-                    <a:bodyPr/>
-                    <a:lstStyle/>
-                    <a:p>
-                      <a:pPr algn="l" fontAlgn="t"/>
-                      <a:r>
-                        <a:rPr lang="et-EE" sz="1000" b="0" dirty="0">
-                          <a:solidFill>
-                            <a:srgbClr val="707070"/>
-                          </a:solidFill>
-                          <a:effectLst/>
-                          <a:latin typeface="DIN-Regular"/>
-                        </a:rPr>
-                        <a:t>NOK</a:t>
-                      </a:r>
-                    </a:p>
-                  </a:txBody>
-                  <a:tcPr marL="95250" marR="95250" marT="47625" marB="47625">
-                    <a:lnL w="6350" cap="flat" cmpd="sng" algn="ctr">
-                      <a:noFill/>
-                      <a:prstDash val="solid"/>
-                      <a:round/>
-                      <a:headEnd type="none" w="med" len="med"/>
-                      <a:tailEnd type="none" w="med" len="med"/>
-                    </a:lnL>
-                    <a:lnR w="6350" cap="flat" cmpd="sng" algn="ctr">
-                      <a:noFill/>
-                      <a:prstDash val="solid"/>
-                      <a:round/>
-                      <a:headEnd type="none" w="med" len="med"/>
-                      <a:tailEnd type="none" w="med" len="med"/>
-                    </a:lnR>
-                    <a:lnT w="6350" cap="flat" cmpd="sng" algn="ctr">
-                      <a:solidFill>
-                        <a:srgbClr val="707070"/>
-                      </a:solidFill>
-                      <a:prstDash val="solid"/>
-                      <a:round/>
-                      <a:headEnd type="none" w="med" len="med"/>
-                      <a:tailEnd type="none" w="med" len="med"/>
-                    </a:lnT>
-                    <a:lnB w="6350" cap="flat" cmpd="sng" algn="ctr">
-                      <a:solidFill>
-                        <a:srgbClr val="707070"/>
-                      </a:solidFill>
-                      <a:prstDash val="solid"/>
-                      <a:round/>
-                      <a:headEnd type="none" w="med" len="med"/>
-                      <a:tailEnd type="none" w="med" len="med"/>
-                    </a:lnB>
-                    <a:lnTlToBr w="12700" cmpd="sng">
-                      <a:noFill/>
-                      <a:prstDash val="solid"/>
-                    </a:lnTlToBr>
-                    <a:lnBlToTr w="12700" cmpd="sng">
-                      <a:noFill/>
-                      <a:prstDash val="solid"/>
-                    </a:lnBlToTr>
-                    <a:noFill/>
-                  </a:tcPr>
-                </a:tc>
-                <a:tc>
-                  <a:txBody>
-                    <a:bodyPr/>
-                    <a:lstStyle/>
-                    <a:p>
-                      <a:pPr algn="l" fontAlgn="t"/>
-                      <a:r>
-                        <a:rPr lang="et-EE" sz="1000" b="0" dirty="0">
-                          <a:solidFill>
-                            <a:srgbClr val="707070"/>
-                          </a:solidFill>
-                          <a:effectLst/>
-                          <a:latin typeface="DIN-Regular"/>
-                        </a:rPr>
-                        <a:t>NOK</a:t>
-                      </a:r>
-                    </a:p>
-                  </a:txBody>
-                  <a:tcPr marL="95250" marR="95250" marT="47625" marB="47625">
-                    <a:lnL w="6350" cap="flat" cmpd="sng" algn="ctr">
-                      <a:noFill/>
-                      <a:prstDash val="solid"/>
-                      <a:round/>
-                      <a:headEnd type="none" w="med" len="med"/>
-                      <a:tailEnd type="none" w="med" len="med"/>
-                    </a:lnL>
-                    <a:lnR w="6350" cap="flat" cmpd="sng" algn="ctr">
-                      <a:noFill/>
-                      <a:prstDash val="solid"/>
-                      <a:round/>
-                      <a:headEnd type="none" w="med" len="med"/>
-                      <a:tailEnd type="none" w="med" len="med"/>
-                    </a:lnR>
-                    <a:lnT w="6350" cap="flat" cmpd="sng" algn="ctr">
-                      <a:solidFill>
-                        <a:srgbClr val="707070"/>
-                      </a:solidFill>
-                      <a:prstDash val="solid"/>
-                      <a:round/>
-                      <a:headEnd type="none" w="med" len="med"/>
-                      <a:tailEnd type="none" w="med" len="med"/>
-                    </a:lnT>
-                    <a:lnB w="6350" cap="flat" cmpd="sng" algn="ctr">
-                      <a:solidFill>
-                        <a:srgbClr val="707070"/>
-                      </a:solidFill>
-                      <a:prstDash val="solid"/>
-                      <a:round/>
-                      <a:headEnd type="none" w="med" len="med"/>
-                      <a:tailEnd type="none" w="med" len="med"/>
-                    </a:lnB>
-                    <a:lnTlToBr w="12700" cmpd="sng">
-                      <a:noFill/>
-                      <a:prstDash val="solid"/>
-                    </a:lnTlToBr>
-                    <a:lnBlToTr w="12700" cmpd="sng">
-                      <a:noFill/>
-                      <a:prstDash val="solid"/>
-                    </a:lnBlToTr>
-                    <a:noFill/>
-                  </a:tcPr>
-                </a:tc>
-                <a:tc>
-                  <a:txBody>
-                    <a:bodyPr/>
-                    <a:lstStyle/>
-                    <a:p>
-                      <a:pPr algn="l" fontAlgn="t"/>
-                      <a:r>
-                        <a:rPr lang="et-EE" sz="1000" b="0" dirty="0">
-                          <a:solidFill>
-                            <a:srgbClr val="707070"/>
-                          </a:solidFill>
-                          <a:effectLst/>
-                          <a:latin typeface="DIN-Regular"/>
-                        </a:rPr>
-                        <a:t>OK</a:t>
-                      </a:r>
-                    </a:p>
-                  </a:txBody>
-                  <a:tcPr marL="95250" marR="95250" marT="47625" marB="47625">
-                    <a:lnL w="6350" cap="flat" cmpd="sng" algn="ctr">
-                      <a:noFill/>
-                      <a:prstDash val="solid"/>
-                      <a:round/>
-                      <a:headEnd type="none" w="med" len="med"/>
-                      <a:tailEnd type="none" w="med" len="med"/>
-                    </a:lnL>
-                    <a:lnR w="6350" cap="flat" cmpd="sng" algn="ctr">
-                      <a:noFill/>
-                      <a:prstDash val="solid"/>
-                      <a:round/>
-                      <a:headEnd type="none" w="med" len="med"/>
-                      <a:tailEnd type="none" w="med" len="med"/>
-                    </a:lnR>
-                    <a:lnT w="6350" cap="flat" cmpd="sng" algn="ctr">
-                      <a:solidFill>
-                        <a:srgbClr val="707070"/>
-                      </a:solidFill>
-                      <a:prstDash val="solid"/>
-                      <a:round/>
-                      <a:headEnd type="none" w="med" len="med"/>
-                      <a:tailEnd type="none" w="med" len="med"/>
-                    </a:lnT>
-                    <a:lnB w="6350" cap="flat" cmpd="sng" algn="ctr">
-                      <a:solidFill>
-                        <a:srgbClr val="707070"/>
-                      </a:solidFill>
-                      <a:prstDash val="solid"/>
-                      <a:round/>
-                      <a:headEnd type="none" w="med" len="med"/>
-                      <a:tailEnd type="none" w="med" len="med"/>
-                    </a:lnB>
-                    <a:lnTlToBr w="12700" cmpd="sng">
-                      <a:noFill/>
-                      <a:prstDash val="solid"/>
-                    </a:lnTlToBr>
-                    <a:lnBlToTr w="12700" cmpd="sng">
-                      <a:noFill/>
-                      <a:prstDash val="solid"/>
-                    </a:lnBlToTr>
-                    <a:noFill/>
-                  </a:tcPr>
-                </a:tc>
-                <a:tc>
-                  <a:txBody>
-                    <a:bodyPr/>
-                    <a:lstStyle/>
-                    <a:p>
-                      <a:pPr algn="l" fontAlgn="t"/>
-                      <a:r>
-                        <a:rPr lang="et-EE" sz="1000" b="0" dirty="0">
-                          <a:solidFill>
-                            <a:srgbClr val="707070"/>
-                          </a:solidFill>
-                          <a:effectLst/>
-                          <a:latin typeface="DIN-Regular"/>
-                        </a:rPr>
-                        <a:t>NOK</a:t>
-                      </a:r>
-                    </a:p>
-                  </a:txBody>
-                  <a:tcPr marL="95250" marR="95250" marT="47625" marB="47625">
-                    <a:lnL w="6350" cap="flat" cmpd="sng" algn="ctr">
-                      <a:noFill/>
-                      <a:prstDash val="solid"/>
-                      <a:round/>
-                      <a:headEnd type="none" w="med" len="med"/>
-                      <a:tailEnd type="none" w="med" len="med"/>
-                    </a:lnL>
-                    <a:lnR w="6350" cap="flat" cmpd="sng" algn="ctr">
-                      <a:noFill/>
-                      <a:prstDash val="solid"/>
-                      <a:round/>
-                      <a:headEnd type="none" w="med" len="med"/>
-                      <a:tailEnd type="none" w="med" len="med"/>
-                    </a:lnR>
-                    <a:lnT w="6350" cap="flat" cmpd="sng" algn="ctr">
-                      <a:solidFill>
-                        <a:srgbClr val="707070"/>
-                      </a:solidFill>
-                      <a:prstDash val="solid"/>
-                      <a:round/>
-                      <a:headEnd type="none" w="med" len="med"/>
-                      <a:tailEnd type="none" w="med" len="med"/>
-                    </a:lnT>
-                    <a:lnB w="6350" cap="flat" cmpd="sng" algn="ctr">
-                      <a:solidFill>
-                        <a:srgbClr val="707070"/>
-                      </a:solidFill>
-                      <a:prstDash val="solid"/>
-                      <a:round/>
-                      <a:headEnd type="none" w="med" len="med"/>
-                      <a:tailEnd type="none" w="med" len="med"/>
-                    </a:lnB>
-                    <a:lnTlToBr w="12700" cmpd="sng">
-                      <a:noFill/>
-                      <a:prstDash val="solid"/>
-                    </a:lnTlToBr>
-                    <a:lnBlToTr w="12700" cmpd="sng">
-                      <a:noFill/>
-                      <a:prstDash val="solid"/>
-                    </a:lnBlToTr>
-                    <a:noFill/>
-                  </a:tcPr>
-                </a:tc>
-                <a:tc>
-                  <a:txBody>
-                    <a:bodyPr/>
-                    <a:lstStyle/>
-                    <a:p>
-                      <a:pPr algn="l" fontAlgn="t"/>
-                      <a:r>
-                        <a:rPr lang="et-EE" sz="1000" b="0" dirty="0">
-                          <a:solidFill>
-                            <a:srgbClr val="707070"/>
-                          </a:solidFill>
-                          <a:effectLst/>
-                          <a:latin typeface="DIN-Regular"/>
-                        </a:rPr>
-                        <a:t>OK</a:t>
-                      </a:r>
-                    </a:p>
-                  </a:txBody>
-                  <a:tcPr marL="95250" marR="95250" marT="47625" marB="47625">
-                    <a:lnL w="6350" cap="flat" cmpd="sng" algn="ctr">
-                      <a:noFill/>
-                      <a:prstDash val="solid"/>
-                      <a:round/>
-                      <a:headEnd type="none" w="med" len="med"/>
-                      <a:tailEnd type="none" w="med" len="med"/>
-                    </a:lnL>
-                    <a:lnR w="6350" cap="flat" cmpd="sng" algn="ctr">
-                      <a:noFill/>
-                      <a:prstDash val="solid"/>
-                      <a:round/>
-                      <a:headEnd type="none" w="med" len="med"/>
-                      <a:tailEnd type="none" w="med" len="med"/>
-                    </a:lnR>
-                    <a:lnT w="6350" cap="flat" cmpd="sng" algn="ctr">
-                      <a:solidFill>
-                        <a:srgbClr val="707070"/>
-                      </a:solidFill>
-                      <a:prstDash val="solid"/>
-                      <a:round/>
-                      <a:headEnd type="none" w="med" len="med"/>
-                      <a:tailEnd type="none" w="med" len="med"/>
-                    </a:lnT>
-                    <a:lnB w="6350" cap="flat" cmpd="sng" algn="ctr">
-                      <a:solidFill>
-                        <a:srgbClr val="707070"/>
-                      </a:solidFill>
-                      <a:prstDash val="solid"/>
-                      <a:round/>
-                      <a:headEnd type="none" w="med" len="med"/>
-                      <a:tailEnd type="none" w="med" len="med"/>
-                    </a:lnB>
-                    <a:lnTlToBr w="12700" cmpd="sng">
-                      <a:noFill/>
-                      <a:prstDash val="solid"/>
-                    </a:lnTlToBr>
-                    <a:lnBlToTr w="12700" cmpd="sng">
-                      <a:noFill/>
-                      <a:prstDash val="solid"/>
-                    </a:lnBlToTr>
-                    <a:noFill/>
-                  </a:tcPr>
-                </a:tc>
-                <a:extLst>
-                  <a:ext uri="{0D108BD9-81ED-4DB2-BD59-A6C34878D82A}">
-                    <a16:rowId xmlns="" xmlns:a16="http://schemas.microsoft.com/office/drawing/2014/main" val="10004"/>
-                  </a:ext>
-                </a:extLst>
-              </a:tr>
-              <a:tr h="370840">
-                <a:tc>
-                  <a:txBody>
-                    <a:bodyPr/>
-                    <a:lstStyle/>
-                    <a:p>
-                      <a:pPr algn="l" fontAlgn="t"/>
-                      <a:r>
-                        <a:rPr lang="et-EE" sz="1000" b="1" dirty="0">
-                          <a:solidFill>
-                            <a:srgbClr val="707070"/>
-                          </a:solidFill>
-                          <a:effectLst/>
-                          <a:latin typeface="DIN-Regular"/>
-                        </a:rPr>
-                        <a:t>DIGIDOC-XML 1.0...1.3</a:t>
-                      </a:r>
-                    </a:p>
-                  </a:txBody>
-                  <a:tcPr marL="95250" marR="95250" marT="47625" marB="47625">
-                    <a:lnL w="6350" cap="flat" cmpd="sng" algn="ctr">
-                      <a:noFill/>
-                      <a:prstDash val="solid"/>
-                      <a:round/>
-                      <a:headEnd type="none" w="med" len="med"/>
-                      <a:tailEnd type="none" w="med" len="med"/>
-                    </a:lnL>
-                    <a:lnR w="6350" cap="flat" cmpd="sng" algn="ctr">
-                      <a:noFill/>
-                      <a:prstDash val="solid"/>
-                      <a:round/>
-                      <a:headEnd type="none" w="med" len="med"/>
-                      <a:tailEnd type="none" w="med" len="med"/>
-                    </a:lnR>
-                    <a:lnT w="6350" cap="flat" cmpd="sng" algn="ctr">
-                      <a:solidFill>
-                        <a:srgbClr val="707070"/>
-                      </a:solidFill>
-                      <a:prstDash val="solid"/>
-                      <a:round/>
-                      <a:headEnd type="none" w="med" len="med"/>
-                      <a:tailEnd type="none" w="med" len="med"/>
-                    </a:lnT>
-                    <a:lnB w="6350" cap="flat" cmpd="sng" algn="ctr">
-                      <a:solidFill>
-                        <a:srgbClr val="707070"/>
-                      </a:solidFill>
-                      <a:prstDash val="solid"/>
-                      <a:round/>
-                      <a:headEnd type="none" w="med" len="med"/>
-                      <a:tailEnd type="none" w="med" len="med"/>
-                    </a:lnB>
-                    <a:lnTlToBr w="12700" cmpd="sng">
-                      <a:noFill/>
-                      <a:prstDash val="solid"/>
-                    </a:lnTlToBr>
-                    <a:lnBlToTr w="12700" cmpd="sng">
-                      <a:noFill/>
-                      <a:prstDash val="solid"/>
-                    </a:lnBlToTr>
-                    <a:noFill/>
-                  </a:tcPr>
-                </a:tc>
-                <a:tc>
-                  <a:txBody>
-                    <a:bodyPr/>
-                    <a:lstStyle/>
-                    <a:p>
-                      <a:pPr algn="l" fontAlgn="t"/>
-                      <a:r>
-                        <a:rPr lang="et-EE" sz="1000" b="0" dirty="0">
-                          <a:solidFill>
-                            <a:srgbClr val="707070"/>
-                          </a:solidFill>
-                          <a:effectLst/>
-                          <a:latin typeface="DIN-Regular"/>
-                        </a:rPr>
-                        <a:t>NOK</a:t>
-                      </a:r>
-                    </a:p>
-                  </a:txBody>
-                  <a:tcPr marL="95250" marR="95250" marT="47625" marB="47625">
-                    <a:lnL w="6350" cap="flat" cmpd="sng" algn="ctr">
-                      <a:noFill/>
-                      <a:prstDash val="solid"/>
-                      <a:round/>
-                      <a:headEnd type="none" w="med" len="med"/>
-                      <a:tailEnd type="none" w="med" len="med"/>
-                    </a:lnL>
-                    <a:lnR w="6350" cap="flat" cmpd="sng" algn="ctr">
-                      <a:noFill/>
-                      <a:prstDash val="solid"/>
-                      <a:round/>
-                      <a:headEnd type="none" w="med" len="med"/>
-                      <a:tailEnd type="none" w="med" len="med"/>
-                    </a:lnR>
-                    <a:lnT w="6350" cap="flat" cmpd="sng" algn="ctr">
-                      <a:solidFill>
-                        <a:srgbClr val="707070"/>
-                      </a:solidFill>
-                      <a:prstDash val="solid"/>
-                      <a:round/>
-                      <a:headEnd type="none" w="med" len="med"/>
-                      <a:tailEnd type="none" w="med" len="med"/>
-                    </a:lnT>
-                    <a:lnB w="6350" cap="flat" cmpd="sng" algn="ctr">
-                      <a:solidFill>
-                        <a:srgbClr val="707070"/>
-                      </a:solidFill>
-                      <a:prstDash val="solid"/>
-                      <a:round/>
-                      <a:headEnd type="none" w="med" len="med"/>
-                      <a:tailEnd type="none" w="med" len="med"/>
-                    </a:lnB>
-                    <a:lnTlToBr w="12700" cmpd="sng">
-                      <a:noFill/>
-                      <a:prstDash val="solid"/>
-                    </a:lnTlToBr>
-                    <a:lnBlToTr w="12700" cmpd="sng">
-                      <a:noFill/>
-                      <a:prstDash val="solid"/>
-                    </a:lnBlToTr>
-                    <a:noFill/>
-                  </a:tcPr>
-                </a:tc>
-                <a:tc>
-                  <a:txBody>
-                    <a:bodyPr/>
-                    <a:lstStyle/>
-                    <a:p>
-                      <a:pPr algn="l" fontAlgn="t"/>
-                      <a:r>
-                        <a:rPr lang="et-EE" sz="1000" b="0" dirty="0">
-                          <a:solidFill>
-                            <a:srgbClr val="707070"/>
-                          </a:solidFill>
-                          <a:effectLst/>
-                          <a:latin typeface="DIN-Regular"/>
-                        </a:rPr>
-                        <a:t>NOK</a:t>
-                      </a:r>
-                    </a:p>
-                  </a:txBody>
-                  <a:tcPr marL="95250" marR="95250" marT="47625" marB="47625">
-                    <a:lnL w="6350" cap="flat" cmpd="sng" algn="ctr">
-                      <a:noFill/>
-                      <a:prstDash val="solid"/>
-                      <a:round/>
-                      <a:headEnd type="none" w="med" len="med"/>
-                      <a:tailEnd type="none" w="med" len="med"/>
-                    </a:lnL>
-                    <a:lnR w="6350" cap="flat" cmpd="sng" algn="ctr">
-                      <a:noFill/>
-                      <a:prstDash val="solid"/>
-                      <a:round/>
-                      <a:headEnd type="none" w="med" len="med"/>
-                      <a:tailEnd type="none" w="med" len="med"/>
-                    </a:lnR>
-                    <a:lnT w="6350" cap="flat" cmpd="sng" algn="ctr">
-                      <a:solidFill>
-                        <a:srgbClr val="707070"/>
-                      </a:solidFill>
-                      <a:prstDash val="solid"/>
-                      <a:round/>
-                      <a:headEnd type="none" w="med" len="med"/>
-                      <a:tailEnd type="none" w="med" len="med"/>
-                    </a:lnT>
-                    <a:lnB w="6350" cap="flat" cmpd="sng" algn="ctr">
-                      <a:solidFill>
-                        <a:srgbClr val="707070"/>
-                      </a:solidFill>
-                      <a:prstDash val="solid"/>
-                      <a:round/>
-                      <a:headEnd type="none" w="med" len="med"/>
-                      <a:tailEnd type="none" w="med" len="med"/>
-                    </a:lnB>
-                    <a:lnTlToBr w="12700" cmpd="sng">
-                      <a:noFill/>
-                      <a:prstDash val="solid"/>
-                    </a:lnTlToBr>
-                    <a:lnBlToTr w="12700" cmpd="sng">
-                      <a:noFill/>
-                      <a:prstDash val="solid"/>
-                    </a:lnBlToTr>
-                    <a:noFill/>
-                  </a:tcPr>
-                </a:tc>
-                <a:tc>
-                  <a:txBody>
-                    <a:bodyPr/>
-                    <a:lstStyle/>
-                    <a:p>
-                      <a:pPr algn="l" fontAlgn="t"/>
-                      <a:r>
-                        <a:rPr lang="et-EE" sz="1000" b="0" dirty="0">
-                          <a:solidFill>
-                            <a:srgbClr val="707070"/>
-                          </a:solidFill>
-                          <a:effectLst/>
-                          <a:latin typeface="DIN-Regular"/>
-                        </a:rPr>
-                        <a:t>NOK</a:t>
-                      </a:r>
-                    </a:p>
-                  </a:txBody>
-                  <a:tcPr marL="95250" marR="95250" marT="47625" marB="47625">
-                    <a:lnL w="6350" cap="flat" cmpd="sng" algn="ctr">
-                      <a:noFill/>
-                      <a:prstDash val="solid"/>
-                      <a:round/>
-                      <a:headEnd type="none" w="med" len="med"/>
-                      <a:tailEnd type="none" w="med" len="med"/>
-                    </a:lnL>
-                    <a:lnR w="6350" cap="flat" cmpd="sng" algn="ctr">
-                      <a:noFill/>
-                      <a:prstDash val="solid"/>
-                      <a:round/>
-                      <a:headEnd type="none" w="med" len="med"/>
-                      <a:tailEnd type="none" w="med" len="med"/>
-                    </a:lnR>
-                    <a:lnT w="6350" cap="flat" cmpd="sng" algn="ctr">
-                      <a:solidFill>
-                        <a:srgbClr val="707070"/>
-                      </a:solidFill>
-                      <a:prstDash val="solid"/>
-                      <a:round/>
-                      <a:headEnd type="none" w="med" len="med"/>
-                      <a:tailEnd type="none" w="med" len="med"/>
-                    </a:lnT>
-                    <a:lnB w="6350" cap="flat" cmpd="sng" algn="ctr">
-                      <a:solidFill>
-                        <a:srgbClr val="707070"/>
-                      </a:solidFill>
-                      <a:prstDash val="solid"/>
-                      <a:round/>
-                      <a:headEnd type="none" w="med" len="med"/>
-                      <a:tailEnd type="none" w="med" len="med"/>
-                    </a:lnB>
-                    <a:lnTlToBr w="12700" cmpd="sng">
-                      <a:noFill/>
-                      <a:prstDash val="solid"/>
-                    </a:lnTlToBr>
-                    <a:lnBlToTr w="12700" cmpd="sng">
-                      <a:noFill/>
-                      <a:prstDash val="solid"/>
-                    </a:lnBlToTr>
-                    <a:noFill/>
-                  </a:tcPr>
-                </a:tc>
-                <a:tc>
-                  <a:txBody>
-                    <a:bodyPr/>
-                    <a:lstStyle/>
-                    <a:p>
-                      <a:pPr algn="l" fontAlgn="t"/>
-                      <a:r>
-                        <a:rPr lang="et-EE" sz="1000" b="0" dirty="0">
-                          <a:solidFill>
-                            <a:srgbClr val="707070"/>
-                          </a:solidFill>
-                          <a:effectLst/>
-                          <a:latin typeface="DIN-Regular"/>
-                        </a:rPr>
-                        <a:t>NOK</a:t>
-                      </a:r>
-                    </a:p>
-                  </a:txBody>
-                  <a:tcPr marL="95250" marR="95250" marT="47625" marB="47625">
-                    <a:lnL w="6350" cap="flat" cmpd="sng" algn="ctr">
-                      <a:noFill/>
-                      <a:prstDash val="solid"/>
-                      <a:round/>
-                      <a:headEnd type="none" w="med" len="med"/>
-                      <a:tailEnd type="none" w="med" len="med"/>
-                    </a:lnL>
-                    <a:lnR w="6350" cap="flat" cmpd="sng" algn="ctr">
-                      <a:noFill/>
-                      <a:prstDash val="solid"/>
-                      <a:round/>
-                      <a:headEnd type="none" w="med" len="med"/>
-                      <a:tailEnd type="none" w="med" len="med"/>
-                    </a:lnR>
-                    <a:lnT w="6350" cap="flat" cmpd="sng" algn="ctr">
-                      <a:solidFill>
-                        <a:srgbClr val="707070"/>
-                      </a:solidFill>
-                      <a:prstDash val="solid"/>
-                      <a:round/>
-                      <a:headEnd type="none" w="med" len="med"/>
-                      <a:tailEnd type="none" w="med" len="med"/>
-                    </a:lnT>
-                    <a:lnB w="6350" cap="flat" cmpd="sng" algn="ctr">
-                      <a:solidFill>
-                        <a:srgbClr val="707070"/>
-                      </a:solidFill>
-                      <a:prstDash val="solid"/>
-                      <a:round/>
-                      <a:headEnd type="none" w="med" len="med"/>
-                      <a:tailEnd type="none" w="med" len="med"/>
-                    </a:lnB>
-                    <a:lnTlToBr w="12700" cmpd="sng">
-                      <a:noFill/>
-                      <a:prstDash val="solid"/>
-                    </a:lnTlToBr>
-                    <a:lnBlToTr w="12700" cmpd="sng">
-                      <a:noFill/>
-                      <a:prstDash val="solid"/>
-                    </a:lnBlToTr>
-                    <a:noFill/>
-                  </a:tcPr>
-                </a:tc>
-                <a:tc>
-                  <a:txBody>
-                    <a:bodyPr/>
-                    <a:lstStyle/>
-                    <a:p>
-                      <a:pPr algn="l" fontAlgn="t"/>
-                      <a:r>
-                        <a:rPr lang="et-EE" sz="1000" b="0" dirty="0">
-                          <a:solidFill>
-                            <a:srgbClr val="707070"/>
-                          </a:solidFill>
-                          <a:effectLst/>
-                          <a:latin typeface="DIN-Regular"/>
-                        </a:rPr>
-                        <a:t>OK</a:t>
-                      </a:r>
-                    </a:p>
-                  </a:txBody>
-                  <a:tcPr marL="95250" marR="95250" marT="47625" marB="47625">
-                    <a:lnL w="6350" cap="flat" cmpd="sng" algn="ctr">
-                      <a:noFill/>
-                      <a:prstDash val="solid"/>
-                      <a:round/>
-                      <a:headEnd type="none" w="med" len="med"/>
-                      <a:tailEnd type="none" w="med" len="med"/>
-                    </a:lnL>
-                    <a:lnR w="6350" cap="flat" cmpd="sng" algn="ctr">
-                      <a:noFill/>
-                      <a:prstDash val="solid"/>
-                      <a:round/>
-                      <a:headEnd type="none" w="med" len="med"/>
-                      <a:tailEnd type="none" w="med" len="med"/>
-                    </a:lnR>
-                    <a:lnT w="6350" cap="flat" cmpd="sng" algn="ctr">
-                      <a:solidFill>
-                        <a:srgbClr val="707070"/>
-                      </a:solidFill>
-                      <a:prstDash val="solid"/>
-                      <a:round/>
-                      <a:headEnd type="none" w="med" len="med"/>
-                      <a:tailEnd type="none" w="med" len="med"/>
-                    </a:lnT>
-                    <a:lnB w="6350" cap="flat" cmpd="sng" algn="ctr">
-                      <a:solidFill>
-                        <a:srgbClr val="707070"/>
-                      </a:solidFill>
-                      <a:prstDash val="solid"/>
-                      <a:round/>
-                      <a:headEnd type="none" w="med" len="med"/>
-                      <a:tailEnd type="none" w="med" len="med"/>
-                    </a:lnB>
-                    <a:lnTlToBr w="12700" cmpd="sng">
-                      <a:noFill/>
-                      <a:prstDash val="solid"/>
-                    </a:lnTlToBr>
-                    <a:lnBlToTr w="12700" cmpd="sng">
-                      <a:noFill/>
-                      <a:prstDash val="solid"/>
-                    </a:lnBlToTr>
-                    <a:noFill/>
-                  </a:tcPr>
-                </a:tc>
-                <a:tc>
-                  <a:txBody>
-                    <a:bodyPr/>
-                    <a:lstStyle/>
-                    <a:p>
-                      <a:pPr algn="l" fontAlgn="t"/>
-                      <a:r>
-                        <a:rPr lang="et-EE" sz="1000" b="0" dirty="0">
-                          <a:solidFill>
-                            <a:srgbClr val="707070"/>
-                          </a:solidFill>
-                          <a:effectLst/>
-                          <a:latin typeface="DIN-Regular"/>
-                        </a:rPr>
-                        <a:t>NOK</a:t>
-                      </a:r>
-                    </a:p>
-                  </a:txBody>
-                  <a:tcPr marL="95250" marR="95250" marT="47625" marB="47625">
-                    <a:lnL w="6350" cap="flat" cmpd="sng" algn="ctr">
-                      <a:noFill/>
-                      <a:prstDash val="solid"/>
-                      <a:round/>
-                      <a:headEnd type="none" w="med" len="med"/>
-                      <a:tailEnd type="none" w="med" len="med"/>
-                    </a:lnL>
-                    <a:lnR w="6350" cap="flat" cmpd="sng" algn="ctr">
-                      <a:noFill/>
-                      <a:prstDash val="solid"/>
-                      <a:round/>
-                      <a:headEnd type="none" w="med" len="med"/>
-                      <a:tailEnd type="none" w="med" len="med"/>
-                    </a:lnR>
-                    <a:lnT w="6350" cap="flat" cmpd="sng" algn="ctr">
-                      <a:solidFill>
-                        <a:srgbClr val="707070"/>
-                      </a:solidFill>
-                      <a:prstDash val="solid"/>
-                      <a:round/>
-                      <a:headEnd type="none" w="med" len="med"/>
-                      <a:tailEnd type="none" w="med" len="med"/>
-                    </a:lnT>
-                    <a:lnB w="6350" cap="flat" cmpd="sng" algn="ctr">
-                      <a:solidFill>
-                        <a:srgbClr val="707070"/>
-                      </a:solidFill>
-                      <a:prstDash val="solid"/>
-                      <a:round/>
-                      <a:headEnd type="none" w="med" len="med"/>
-                      <a:tailEnd type="none" w="med" len="med"/>
-                    </a:lnB>
-                    <a:lnTlToBr w="12700" cmpd="sng">
-                      <a:noFill/>
-                      <a:prstDash val="solid"/>
-                    </a:lnTlToBr>
-                    <a:lnBlToTr w="12700" cmpd="sng">
-                      <a:noFill/>
-                      <a:prstDash val="solid"/>
-                    </a:lnBlToTr>
-                    <a:noFill/>
-                  </a:tcPr>
-                </a:tc>
-                <a:extLst>
-                  <a:ext uri="{0D108BD9-81ED-4DB2-BD59-A6C34878D82A}">
-                    <a16:rowId xmlns="" xmlns:a16="http://schemas.microsoft.com/office/drawing/2014/main" val="10005"/>
-                  </a:ext>
-                </a:extLst>
-              </a:tr>
-              <a:tr h="370840">
-                <a:tc>
-                  <a:txBody>
-                    <a:bodyPr/>
-                    <a:lstStyle/>
-                    <a:p>
-                      <a:pPr algn="l" fontAlgn="t"/>
-                      <a:r>
-                        <a:rPr lang="et-EE" sz="1000" b="1" dirty="0">
-                          <a:solidFill>
-                            <a:srgbClr val="707070"/>
-                          </a:solidFill>
-                          <a:effectLst/>
-                          <a:latin typeface="DIN-Regular"/>
-                        </a:rPr>
-                        <a:t>DIGIDOC-XML 1.0...1.3 </a:t>
-                      </a:r>
-                      <a:r>
-                        <a:rPr lang="et-EE" sz="1000" b="1" i="1" dirty="0" err="1">
-                          <a:solidFill>
-                            <a:srgbClr val="707070"/>
-                          </a:solidFill>
-                          <a:effectLst/>
-                          <a:latin typeface="DIN-Regular"/>
-                        </a:rPr>
-                        <a:t>hashcode</a:t>
-                      </a:r>
-                      <a:endParaRPr lang="et-EE" sz="1000" b="1" i="1" dirty="0">
-                        <a:solidFill>
-                          <a:srgbClr val="707070"/>
-                        </a:solidFill>
-                        <a:effectLst/>
-                        <a:latin typeface="DIN-Regular"/>
-                      </a:endParaRPr>
-                    </a:p>
-                  </a:txBody>
-                  <a:tcPr marL="95250" marR="95250" marT="47625" marB="47625">
-                    <a:lnL w="6350" cap="flat" cmpd="sng" algn="ctr">
-                      <a:noFill/>
-                      <a:prstDash val="solid"/>
-                      <a:round/>
-                      <a:headEnd type="none" w="med" len="med"/>
-                      <a:tailEnd type="none" w="med" len="med"/>
-                    </a:lnL>
-                    <a:lnR w="6350" cap="flat" cmpd="sng" algn="ctr">
-                      <a:noFill/>
-                      <a:prstDash val="solid"/>
-                      <a:round/>
-                      <a:headEnd type="none" w="med" len="med"/>
-                      <a:tailEnd type="none" w="med" len="med"/>
-                    </a:lnR>
-                    <a:lnT w="6350" cap="flat" cmpd="sng" algn="ctr">
-                      <a:solidFill>
-                        <a:srgbClr val="707070"/>
-                      </a:solidFill>
-                      <a:prstDash val="solid"/>
-                      <a:round/>
-                      <a:headEnd type="none" w="med" len="med"/>
-                      <a:tailEnd type="none" w="med" len="med"/>
-                    </a:lnT>
-                    <a:lnB w="6350" cap="flat" cmpd="sng" algn="ctr">
-                      <a:noFill/>
-                      <a:prstDash val="solid"/>
-                      <a:round/>
-                      <a:headEnd type="none" w="med" len="med"/>
-                      <a:tailEnd type="none" w="med" len="med"/>
-                    </a:lnB>
-                    <a:lnTlToBr w="12700" cmpd="sng">
-                      <a:noFill/>
-                      <a:prstDash val="solid"/>
-                    </a:lnTlToBr>
-                    <a:lnBlToTr w="12700" cmpd="sng">
-                      <a:noFill/>
-                      <a:prstDash val="solid"/>
-                    </a:lnBlToTr>
-                    <a:noFill/>
-                  </a:tcPr>
-                </a:tc>
-                <a:tc>
-                  <a:txBody>
-                    <a:bodyPr/>
-                    <a:lstStyle/>
-                    <a:p>
-                      <a:pPr algn="l" fontAlgn="t"/>
-                      <a:r>
-                        <a:rPr lang="et-EE" sz="1000" b="0" dirty="0">
-                          <a:solidFill>
-                            <a:srgbClr val="707070"/>
-                          </a:solidFill>
-                          <a:effectLst/>
-                          <a:latin typeface="DIN-Regular"/>
-                        </a:rPr>
-                        <a:t>NOK</a:t>
-                      </a:r>
-                    </a:p>
-                  </a:txBody>
-                  <a:tcPr marL="95250" marR="95250" marT="47625" marB="47625">
-                    <a:lnL w="6350" cap="flat" cmpd="sng" algn="ctr">
-                      <a:noFill/>
-                      <a:prstDash val="solid"/>
-                      <a:round/>
-                      <a:headEnd type="none" w="med" len="med"/>
-                      <a:tailEnd type="none" w="med" len="med"/>
-                    </a:lnL>
-                    <a:lnR w="6350" cap="flat" cmpd="sng" algn="ctr">
-                      <a:noFill/>
-                      <a:prstDash val="solid"/>
-                      <a:round/>
-                      <a:headEnd type="none" w="med" len="med"/>
-                      <a:tailEnd type="none" w="med" len="med"/>
-                    </a:lnR>
-                    <a:lnT w="6350" cap="flat" cmpd="sng" algn="ctr">
-                      <a:solidFill>
-                        <a:srgbClr val="707070"/>
-                      </a:solidFill>
-                      <a:prstDash val="solid"/>
-                      <a:round/>
-                      <a:headEnd type="none" w="med" len="med"/>
-                      <a:tailEnd type="none" w="med" len="med"/>
-                    </a:lnT>
-                    <a:lnB w="6350" cap="flat" cmpd="sng" algn="ctr">
-                      <a:noFill/>
-                      <a:prstDash val="solid"/>
-                      <a:round/>
-                      <a:headEnd type="none" w="med" len="med"/>
-                      <a:tailEnd type="none" w="med" len="med"/>
-                    </a:lnB>
-                    <a:lnTlToBr w="12700" cmpd="sng">
-                      <a:noFill/>
-                      <a:prstDash val="solid"/>
-                    </a:lnTlToBr>
-                    <a:lnBlToTr w="12700" cmpd="sng">
-                      <a:noFill/>
-                      <a:prstDash val="solid"/>
-                    </a:lnBlToTr>
-                    <a:noFill/>
-                  </a:tcPr>
-                </a:tc>
-                <a:tc>
-                  <a:txBody>
-                    <a:bodyPr/>
-                    <a:lstStyle/>
-                    <a:p>
-                      <a:pPr algn="l" fontAlgn="t"/>
-                      <a:r>
-                        <a:rPr lang="et-EE" sz="1000" b="0" dirty="0">
-                          <a:solidFill>
-                            <a:srgbClr val="707070"/>
-                          </a:solidFill>
-                          <a:effectLst/>
-                          <a:latin typeface="DIN-Regular"/>
-                        </a:rPr>
-                        <a:t>NOK</a:t>
-                      </a:r>
-                    </a:p>
-                  </a:txBody>
-                  <a:tcPr marL="95250" marR="95250" marT="47625" marB="47625">
-                    <a:lnL w="6350" cap="flat" cmpd="sng" algn="ctr">
-                      <a:noFill/>
-                      <a:prstDash val="solid"/>
-                      <a:round/>
-                      <a:headEnd type="none" w="med" len="med"/>
-                      <a:tailEnd type="none" w="med" len="med"/>
-                    </a:lnL>
-                    <a:lnR w="6350" cap="flat" cmpd="sng" algn="ctr">
-                      <a:noFill/>
-                      <a:prstDash val="solid"/>
-                      <a:round/>
-                      <a:headEnd type="none" w="med" len="med"/>
-                      <a:tailEnd type="none" w="med" len="med"/>
-                    </a:lnR>
-                    <a:lnT w="6350" cap="flat" cmpd="sng" algn="ctr">
-                      <a:solidFill>
-                        <a:srgbClr val="707070"/>
-                      </a:solidFill>
-                      <a:prstDash val="solid"/>
-                      <a:round/>
-                      <a:headEnd type="none" w="med" len="med"/>
-                      <a:tailEnd type="none" w="med" len="med"/>
-                    </a:lnT>
-                    <a:lnB w="6350" cap="flat" cmpd="sng" algn="ctr">
-                      <a:noFill/>
-                      <a:prstDash val="solid"/>
-                      <a:round/>
-                      <a:headEnd type="none" w="med" len="med"/>
-                      <a:tailEnd type="none" w="med" len="med"/>
-                    </a:lnB>
-                    <a:lnTlToBr w="12700" cmpd="sng">
-                      <a:noFill/>
-                      <a:prstDash val="solid"/>
-                    </a:lnTlToBr>
-                    <a:lnBlToTr w="12700" cmpd="sng">
-                      <a:noFill/>
-                      <a:prstDash val="solid"/>
-                    </a:lnBlToTr>
-                    <a:noFill/>
-                  </a:tcPr>
-                </a:tc>
-                <a:tc>
-                  <a:txBody>
-                    <a:bodyPr/>
-                    <a:lstStyle/>
-                    <a:p>
-                      <a:pPr algn="l" fontAlgn="t"/>
-                      <a:r>
-                        <a:rPr lang="et-EE" sz="1000" b="0" dirty="0">
-                          <a:solidFill>
-                            <a:srgbClr val="707070"/>
-                          </a:solidFill>
-                          <a:effectLst/>
-                          <a:latin typeface="DIN-Regular"/>
-                        </a:rPr>
-                        <a:t>NOK</a:t>
-                      </a:r>
-                    </a:p>
-                  </a:txBody>
-                  <a:tcPr marL="95250" marR="95250" marT="47625" marB="47625">
-                    <a:lnL w="6350" cap="flat" cmpd="sng" algn="ctr">
-                      <a:noFill/>
-                      <a:prstDash val="solid"/>
-                      <a:round/>
-                      <a:headEnd type="none" w="med" len="med"/>
-                      <a:tailEnd type="none" w="med" len="med"/>
-                    </a:lnL>
-                    <a:lnR w="6350" cap="flat" cmpd="sng" algn="ctr">
-                      <a:noFill/>
-                      <a:prstDash val="solid"/>
-                      <a:round/>
-                      <a:headEnd type="none" w="med" len="med"/>
-                      <a:tailEnd type="none" w="med" len="med"/>
-                    </a:lnR>
-                    <a:lnT w="6350" cap="flat" cmpd="sng" algn="ctr">
-                      <a:solidFill>
-                        <a:srgbClr val="707070"/>
-                      </a:solidFill>
-                      <a:prstDash val="solid"/>
-                      <a:round/>
-                      <a:headEnd type="none" w="med" len="med"/>
-                      <a:tailEnd type="none" w="med" len="med"/>
-                    </a:lnT>
-                    <a:lnB w="6350" cap="flat" cmpd="sng" algn="ctr">
-                      <a:noFill/>
-                      <a:prstDash val="solid"/>
-                      <a:round/>
-                      <a:headEnd type="none" w="med" len="med"/>
-                      <a:tailEnd type="none" w="med" len="med"/>
-                    </a:lnB>
-                    <a:lnTlToBr w="12700" cmpd="sng">
-                      <a:noFill/>
-                      <a:prstDash val="solid"/>
-                    </a:lnTlToBr>
-                    <a:lnBlToTr w="12700" cmpd="sng">
-                      <a:noFill/>
-                      <a:prstDash val="solid"/>
-                    </a:lnBlToTr>
-                    <a:noFill/>
-                  </a:tcPr>
-                </a:tc>
-                <a:tc>
-                  <a:txBody>
-                    <a:bodyPr/>
-                    <a:lstStyle/>
-                    <a:p>
-                      <a:pPr algn="l" fontAlgn="t"/>
-                      <a:r>
-                        <a:rPr lang="et-EE" sz="1000" b="0" dirty="0">
-                          <a:solidFill>
-                            <a:srgbClr val="707070"/>
-                          </a:solidFill>
-                          <a:effectLst/>
-                          <a:latin typeface="DIN-Regular"/>
-                        </a:rPr>
-                        <a:t>NOK</a:t>
-                      </a:r>
-                    </a:p>
-                  </a:txBody>
-                  <a:tcPr marL="95250" marR="95250" marT="47625" marB="47625">
-                    <a:lnL w="6350" cap="flat" cmpd="sng" algn="ctr">
-                      <a:noFill/>
-                      <a:prstDash val="solid"/>
-                      <a:round/>
-                      <a:headEnd type="none" w="med" len="med"/>
-                      <a:tailEnd type="none" w="med" len="med"/>
-                    </a:lnL>
-                    <a:lnR w="6350" cap="flat" cmpd="sng" algn="ctr">
-                      <a:noFill/>
-                      <a:prstDash val="solid"/>
-                      <a:round/>
-                      <a:headEnd type="none" w="med" len="med"/>
-                      <a:tailEnd type="none" w="med" len="med"/>
-                    </a:lnR>
-                    <a:lnT w="6350" cap="flat" cmpd="sng" algn="ctr">
-                      <a:solidFill>
-                        <a:srgbClr val="707070"/>
-                      </a:solidFill>
-                      <a:prstDash val="solid"/>
-                      <a:round/>
-                      <a:headEnd type="none" w="med" len="med"/>
-                      <a:tailEnd type="none" w="med" len="med"/>
-                    </a:lnT>
-                    <a:lnB w="6350" cap="flat" cmpd="sng" algn="ctr">
-                      <a:noFill/>
-                      <a:prstDash val="solid"/>
-                      <a:round/>
-                      <a:headEnd type="none" w="med" len="med"/>
-                      <a:tailEnd type="none" w="med" len="med"/>
-                    </a:lnB>
-                    <a:lnTlToBr w="12700" cmpd="sng">
-                      <a:noFill/>
-                      <a:prstDash val="solid"/>
-                    </a:lnTlToBr>
-                    <a:lnBlToTr w="12700" cmpd="sng">
-                      <a:noFill/>
-                      <a:prstDash val="solid"/>
-                    </a:lnBlToTr>
-                    <a:noFill/>
-                  </a:tcPr>
-                </a:tc>
-                <a:tc>
-                  <a:txBody>
-                    <a:bodyPr/>
-                    <a:lstStyle/>
-                    <a:p>
-                      <a:pPr algn="l" fontAlgn="t"/>
-                      <a:r>
-                        <a:rPr lang="et-EE" sz="1000" b="0" dirty="0">
-                          <a:solidFill>
-                            <a:srgbClr val="707070"/>
-                          </a:solidFill>
-                          <a:effectLst/>
-                          <a:latin typeface="DIN-Regular"/>
-                        </a:rPr>
-                        <a:t>OK</a:t>
-                      </a:r>
-                    </a:p>
-                  </a:txBody>
-                  <a:tcPr marL="95250" marR="95250" marT="47625" marB="47625">
-                    <a:lnL w="6350" cap="flat" cmpd="sng" algn="ctr">
-                      <a:noFill/>
-                      <a:prstDash val="solid"/>
-                      <a:round/>
-                      <a:headEnd type="none" w="med" len="med"/>
-                      <a:tailEnd type="none" w="med" len="med"/>
-                    </a:lnL>
-                    <a:lnR w="6350" cap="flat" cmpd="sng" algn="ctr">
-                      <a:noFill/>
-                      <a:prstDash val="solid"/>
-                      <a:round/>
-                      <a:headEnd type="none" w="med" len="med"/>
-                      <a:tailEnd type="none" w="med" len="med"/>
-                    </a:lnR>
-                    <a:lnT w="6350" cap="flat" cmpd="sng" algn="ctr">
-                      <a:solidFill>
-                        <a:srgbClr val="707070"/>
-                      </a:solidFill>
-                      <a:prstDash val="solid"/>
-                      <a:round/>
-                      <a:headEnd type="none" w="med" len="med"/>
-                      <a:tailEnd type="none" w="med" len="med"/>
-                    </a:lnT>
-                    <a:lnB w="6350" cap="flat" cmpd="sng" algn="ctr">
-                      <a:noFill/>
-                      <a:prstDash val="solid"/>
-                      <a:round/>
-                      <a:headEnd type="none" w="med" len="med"/>
-                      <a:tailEnd type="none" w="med" len="med"/>
-                    </a:lnB>
-                    <a:lnTlToBr w="12700" cmpd="sng">
-                      <a:noFill/>
-                      <a:prstDash val="solid"/>
-                    </a:lnTlToBr>
-                    <a:lnBlToTr w="12700" cmpd="sng">
-                      <a:noFill/>
-                      <a:prstDash val="solid"/>
-                    </a:lnBlToTr>
-                    <a:noFill/>
-                  </a:tcPr>
-                </a:tc>
-                <a:tc>
-                  <a:txBody>
-                    <a:bodyPr/>
-                    <a:lstStyle/>
-                    <a:p>
-                      <a:pPr algn="l" fontAlgn="t"/>
-                      <a:r>
-                        <a:rPr lang="et-EE" sz="1000" b="0" dirty="0">
-                          <a:solidFill>
-                            <a:srgbClr val="707070"/>
-                          </a:solidFill>
-                          <a:effectLst/>
-                          <a:latin typeface="DIN-Regular"/>
-                        </a:rPr>
-                        <a:t>NOK</a:t>
-                      </a:r>
-                    </a:p>
-                  </a:txBody>
-                  <a:tcPr marL="95250" marR="95250" marT="47625" marB="47625">
-                    <a:lnL w="6350" cap="flat" cmpd="sng" algn="ctr">
-                      <a:noFill/>
-                      <a:prstDash val="solid"/>
-                      <a:round/>
-                      <a:headEnd type="none" w="med" len="med"/>
-                      <a:tailEnd type="none" w="med" len="med"/>
-                    </a:lnL>
-                    <a:lnR w="6350" cap="flat" cmpd="sng" algn="ctr">
-                      <a:noFill/>
-                      <a:prstDash val="solid"/>
-                      <a:round/>
-                      <a:headEnd type="none" w="med" len="med"/>
-                      <a:tailEnd type="none" w="med" len="med"/>
-                    </a:lnR>
-                    <a:lnT w="6350" cap="flat" cmpd="sng" algn="ctr">
-                      <a:solidFill>
-                        <a:srgbClr val="707070"/>
-                      </a:solidFill>
-                      <a:prstDash val="solid"/>
-                      <a:round/>
-                      <a:headEnd type="none" w="med" len="med"/>
-                      <a:tailEnd type="none" w="med" len="med"/>
-                    </a:lnT>
-                    <a:lnB w="6350" cap="flat" cmpd="sng" algn="ctr">
-                      <a:noFill/>
-                      <a:prstDash val="solid"/>
-                      <a:round/>
-                      <a:headEnd type="none" w="med" len="med"/>
-                      <a:tailEnd type="none" w="med" len="med"/>
-                    </a:lnB>
-                    <a:lnTlToBr w="12700" cmpd="sng">
-                      <a:noFill/>
-                      <a:prstDash val="solid"/>
-                    </a:lnTlToBr>
-                    <a:lnBlToTr w="12700" cmpd="sng">
-                      <a:noFill/>
-                      <a:prstDash val="solid"/>
-                    </a:lnBlToTr>
-                    <a:noFill/>
-                  </a:tcPr>
-                </a:tc>
-                <a:extLst>
-                  <a:ext uri="{0D108BD9-81ED-4DB2-BD59-A6C34878D82A}">
-                    <a16:rowId xmlns="" xmlns:a16="http://schemas.microsoft.com/office/drawing/2014/main" val="10006"/>
-                  </a:ext>
-                </a:extLst>
-              </a:tr>
-            </a:tbl>
-          </a:graphicData>
-        </a:graphic>
-      </p:graphicFrame>
+      <p:pic>
+        <p:nvPicPr>
+          <p:cNvPr id="5" name="Picture 4"/>
+          <p:cNvPicPr>
+            <a:picLocks noChangeAspect="1"/>
+          </p:cNvPicPr>
+          <p:nvPr/>
+        </p:nvPicPr>
+        <p:blipFill>
+          <a:blip r:embed="rId2"/>
+          <a:stretch>
+            <a:fillRect/>
+          </a:stretch>
+        </p:blipFill>
+        <p:spPr>
+          <a:xfrm>
+            <a:off x="2033424" y="1490309"/>
+            <a:ext cx="5077151" cy="4745744"/>
+          </a:xfrm>
+          <a:prstGeom prst="rect">
+            <a:avLst/>
+          </a:prstGeom>
+        </p:spPr>
+      </p:pic>
     </p:spTree>
     <p:extLst>
       <p:ext uri="{BB962C8B-B14F-4D97-AF65-F5344CB8AC3E}">
@@ -6769,7 +3731,7 @@
   <p:timing>
     <p:tnLst>
       <p:par>
-        <p:cTn xmlns:p14="http://schemas.microsoft.com/office/powerpoint/2010/main" id="1" dur="indefinite" restart="never" nodeType="tmRoot"/>
+        <p:cTn id="1" dur="indefinite" restart="never" nodeType="tmRoot"/>
       </p:par>
     </p:tnLst>
   </p:timing>
@@ -6849,14 +3811,14 @@
           <p:nvPr>
             <p:extLst>
               <p:ext uri="{D42A27DB-BD31-4B8C-83A1-F6EECF244321}">
-                <p14:modId xmlns:p14="http://schemas.microsoft.com/office/powerpoint/2010/main" val="2428389968"/>
+                <p14:modId xmlns:p14="http://schemas.microsoft.com/office/powerpoint/2010/main" val="3471786906"/>
               </p:ext>
             </p:extLst>
           </p:nvPr>
         </p:nvGraphicFramePr>
         <p:xfrm>
           <a:off x="669727" y="1699601"/>
-          <a:ext cx="7372400" cy="4763374"/>
+          <a:ext cx="7372400" cy="4669617"/>
         </p:xfrm>
         <a:graphic>
           <a:graphicData uri="http://schemas.openxmlformats.org/drawingml/2006/table">
@@ -6866,35 +3828,35 @@
                 <a:gridCol w="1474480">
                   <a:extLst>
                     <a:ext uri="{9D8B030D-6E8A-4147-A177-3AD203B41FA5}">
-                      <a16:colId xmlns="" xmlns:a16="http://schemas.microsoft.com/office/drawing/2014/main" val="1689065519"/>
+                      <a16:colId xmlns:a16="http://schemas.microsoft.com/office/drawing/2014/main" val="1689065519"/>
                     </a:ext>
                   </a:extLst>
                 </a:gridCol>
                 <a:gridCol w="1474480">
                   <a:extLst>
                     <a:ext uri="{9D8B030D-6E8A-4147-A177-3AD203B41FA5}">
-                      <a16:colId xmlns="" xmlns:a16="http://schemas.microsoft.com/office/drawing/2014/main" val="3467872839"/>
+                      <a16:colId xmlns:a16="http://schemas.microsoft.com/office/drawing/2014/main" val="3467872839"/>
                     </a:ext>
                   </a:extLst>
                 </a:gridCol>
                 <a:gridCol w="1474480">
                   <a:extLst>
                     <a:ext uri="{9D8B030D-6E8A-4147-A177-3AD203B41FA5}">
-                      <a16:colId xmlns="" xmlns:a16="http://schemas.microsoft.com/office/drawing/2014/main" val="1639968436"/>
+                      <a16:colId xmlns:a16="http://schemas.microsoft.com/office/drawing/2014/main" val="1639968436"/>
                     </a:ext>
                   </a:extLst>
                 </a:gridCol>
                 <a:gridCol w="1474480">
                   <a:extLst>
                     <a:ext uri="{9D8B030D-6E8A-4147-A177-3AD203B41FA5}">
-                      <a16:colId xmlns="" xmlns:a16="http://schemas.microsoft.com/office/drawing/2014/main" val="424073406"/>
+                      <a16:colId xmlns:a16="http://schemas.microsoft.com/office/drawing/2014/main" val="424073406"/>
                     </a:ext>
                   </a:extLst>
                 </a:gridCol>
                 <a:gridCol w="1474480">
                   <a:extLst>
                     <a:ext uri="{9D8B030D-6E8A-4147-A177-3AD203B41FA5}">
-                      <a16:colId xmlns="" xmlns:a16="http://schemas.microsoft.com/office/drawing/2014/main" val="2479145107"/>
+                      <a16:colId xmlns:a16="http://schemas.microsoft.com/office/drawing/2014/main" val="2479145107"/>
                     </a:ext>
                   </a:extLst>
                 </a:gridCol>
@@ -7486,7 +4448,7 @@
                 </a:tc>
                 <a:extLst>
                   <a:ext uri="{0D108BD9-81ED-4DB2-BD59-A6C34878D82A}">
-                    <a16:rowId xmlns="" xmlns:a16="http://schemas.microsoft.com/office/drawing/2014/main" val="3242566805"/>
+                    <a16:rowId xmlns:a16="http://schemas.microsoft.com/office/drawing/2014/main" val="3242566805"/>
                   </a:ext>
                 </a:extLst>
               </a:tr>
@@ -7830,7 +4792,7 @@
                 </a:tc>
                 <a:extLst>
                   <a:ext uri="{0D108BD9-81ED-4DB2-BD59-A6C34878D82A}">
-                    <a16:rowId xmlns="" xmlns:a16="http://schemas.microsoft.com/office/drawing/2014/main" val="763347926"/>
+                    <a16:rowId xmlns:a16="http://schemas.microsoft.com/office/drawing/2014/main" val="763347926"/>
                   </a:ext>
                 </a:extLst>
               </a:tr>
@@ -8114,7 +5076,7 @@
                 </a:tc>
                 <a:extLst>
                   <a:ext uri="{0D108BD9-81ED-4DB2-BD59-A6C34878D82A}">
-                    <a16:rowId xmlns="" xmlns:a16="http://schemas.microsoft.com/office/drawing/2014/main" val="1324000359"/>
+                    <a16:rowId xmlns:a16="http://schemas.microsoft.com/office/drawing/2014/main" val="1324000359"/>
                   </a:ext>
                 </a:extLst>
               </a:tr>
@@ -8568,7 +5530,7 @@
                 </a:tc>
                 <a:extLst>
                   <a:ext uri="{0D108BD9-81ED-4DB2-BD59-A6C34878D82A}">
-                    <a16:rowId xmlns="" xmlns:a16="http://schemas.microsoft.com/office/drawing/2014/main" val="2756761856"/>
+                    <a16:rowId xmlns:a16="http://schemas.microsoft.com/office/drawing/2014/main" val="2756761856"/>
                   </a:ext>
                 </a:extLst>
               </a:tr>
@@ -8787,7 +5749,7 @@
                         <a:t>ETSI EN 319 162 [9], </a:t>
                       </a:r>
                       <a:r>
-                        <a:rPr lang="en-US" sz="900" dirty="0" err="1">
+                        <a:rPr lang="en-US" sz="900" dirty="0" err="1" smtClean="0">
                           <a:solidFill>
                             <a:srgbClr val="707070"/>
                           </a:solidFill>
@@ -8795,6 +5757,26 @@
                           <a:latin typeface="DIN-Regular"/>
                         </a:rPr>
                         <a:t>ptk</a:t>
+                      </a:r>
+                      <a:endParaRPr lang="et-EE" sz="900" dirty="0" smtClean="0">
+                        <a:solidFill>
+                          <a:srgbClr val="707070"/>
+                        </a:solidFill>
+                        <a:effectLst/>
+                        <a:latin typeface="DIN-Regular"/>
+                      </a:endParaRPr>
+                    </a:p>
+                    <a:p>
+                      <a:pPr algn="l" fontAlgn="t"/>
+                      <a:r>
+                        <a:rPr lang="et-EE" sz="900" dirty="0" smtClean="0">
+                          <a:solidFill>
+                            <a:srgbClr val="707070"/>
+                          </a:solidFill>
+                          <a:effectLst/>
+                          <a:latin typeface="DIN-Regular"/>
+                        </a:rPr>
+                        <a:t>4.4.3</a:t>
                       </a:r>
                       <a:endParaRPr lang="et-EE" sz="900" dirty="0">
                         <a:solidFill>
@@ -8916,7 +5898,7 @@
                 </a:tc>
                 <a:extLst>
                   <a:ext uri="{0D108BD9-81ED-4DB2-BD59-A6C34878D82A}">
-                    <a16:rowId xmlns="" xmlns:a16="http://schemas.microsoft.com/office/drawing/2014/main" val="354077011"/>
+                    <a16:rowId xmlns:a16="http://schemas.microsoft.com/office/drawing/2014/main" val="354077011"/>
                   </a:ext>
                 </a:extLst>
               </a:tr>
@@ -9058,16 +6040,46 @@
                     <a:p>
                       <a:pPr algn="l" fontAlgn="t"/>
                       <a:r>
-                        <a:rPr lang="et-EE" sz="900" i="1">
+                        <a:rPr lang="et-EE" sz="900" dirty="0" smtClean="0">
                           <a:solidFill>
                             <a:srgbClr val="707070"/>
                           </a:solidFill>
                           <a:effectLst/>
                           <a:latin typeface="DIN-Regular"/>
                         </a:rPr>
-                        <a:t>N/A</a:t>
-                      </a:r>
-                      <a:endParaRPr lang="et-EE" sz="900">
+                        <a:t>ETSI EN 319 162 [9], </a:t>
+                      </a:r>
+                      <a:r>
+                        <a:rPr lang="en-US" sz="900" dirty="0" err="1" smtClean="0">
+                          <a:solidFill>
+                            <a:srgbClr val="707070"/>
+                          </a:solidFill>
+                          <a:effectLst/>
+                          <a:latin typeface="DIN-Regular"/>
+                        </a:rPr>
+                        <a:t>ptk</a:t>
+                      </a:r>
+                      <a:endParaRPr lang="et-EE" sz="900" dirty="0" smtClean="0">
+                        <a:solidFill>
+                          <a:srgbClr val="707070"/>
+                        </a:solidFill>
+                        <a:effectLst/>
+                        <a:latin typeface="DIN-Regular"/>
+                      </a:endParaRPr>
+                    </a:p>
+                    <a:p>
+                      <a:pPr algn="l" fontAlgn="t"/>
+                      <a:r>
+                        <a:rPr lang="et-EE" sz="900" dirty="0" smtClean="0">
+                          <a:solidFill>
+                            <a:srgbClr val="707070"/>
+                          </a:solidFill>
+                          <a:effectLst/>
+                          <a:latin typeface="DIN-Regular"/>
+                        </a:rPr>
+                        <a:t>4.4.4</a:t>
+                      </a:r>
+                      <a:endParaRPr lang="et-EE" sz="900" dirty="0">
                         <a:solidFill>
                           <a:srgbClr val="707070"/>
                         </a:solidFill>
@@ -9141,154 +6153,14 @@
                         <a:defRPr/>
                       </a:pPr>
                       <a:r>
-                        <a:rPr lang="en-US" sz="900" dirty="0" err="1">
+                        <a:rPr lang="et-EE" sz="900" dirty="0" smtClean="0">
                           <a:solidFill>
                             <a:srgbClr val="707070"/>
                           </a:solidFill>
                           <a:effectLst/>
                           <a:latin typeface="DIN-Regular"/>
                         </a:rPr>
-                        <a:t>Uus</a:t>
-                      </a:r>
-                      <a:r>
-                        <a:rPr lang="en-US" sz="900" dirty="0">
-                          <a:solidFill>
-                            <a:srgbClr val="707070"/>
-                          </a:solidFill>
-                          <a:effectLst/>
-                          <a:latin typeface="DIN-Regular"/>
-                        </a:rPr>
-                        <a:t> ETSI EN </a:t>
-                      </a:r>
-                      <a:r>
-                        <a:rPr lang="en-US" sz="900" dirty="0" err="1">
-                          <a:solidFill>
-                            <a:srgbClr val="707070"/>
-                          </a:solidFill>
-                          <a:effectLst/>
-                          <a:latin typeface="DIN-Regular"/>
-                        </a:rPr>
-                        <a:t>standardi</a:t>
-                      </a:r>
-                      <a:r>
-                        <a:rPr lang="en-US" sz="900" dirty="0">
-                          <a:solidFill>
-                            <a:srgbClr val="707070"/>
-                          </a:solidFill>
-                          <a:effectLst/>
-                          <a:latin typeface="DIN-Regular"/>
-                        </a:rPr>
-                        <a:t> </a:t>
-                      </a:r>
-                      <a:r>
-                        <a:rPr lang="et-EE" sz="900" dirty="0" err="1">
-                          <a:solidFill>
-                            <a:srgbClr val="707070"/>
-                          </a:solidFill>
-                          <a:effectLst/>
-                          <a:latin typeface="DIN-Regular"/>
-                        </a:rPr>
-                        <a:t>baasp</a:t>
-                      </a:r>
-                      <a:r>
-                        <a:rPr lang="en-US" sz="900" dirty="0" err="1">
-                          <a:solidFill>
-                            <a:srgbClr val="707070"/>
-                          </a:solidFill>
-                          <a:effectLst/>
-                          <a:latin typeface="DIN-Regular"/>
-                        </a:rPr>
-                        <a:t>rofiil</a:t>
-                      </a:r>
-                      <a:r>
-                        <a:rPr lang="en-US" sz="900" baseline="0" dirty="0">
-                          <a:solidFill>
-                            <a:srgbClr val="707070"/>
-                          </a:solidFill>
-                          <a:effectLst/>
-                          <a:latin typeface="DIN-Regular"/>
-                        </a:rPr>
-                        <a:t> </a:t>
-                      </a:r>
-                      <a:r>
-                        <a:rPr lang="en-US" sz="900" baseline="0" dirty="0" err="1">
-                          <a:solidFill>
-                            <a:srgbClr val="707070"/>
-                          </a:solidFill>
-                          <a:effectLst/>
-                          <a:latin typeface="DIN-Regular"/>
-                        </a:rPr>
-                        <a:t>e</a:t>
-                      </a:r>
-                      <a:r>
-                        <a:rPr lang="en-US" sz="900" dirty="0" err="1">
-                          <a:solidFill>
-                            <a:srgbClr val="707070"/>
-                          </a:solidFill>
-                          <a:effectLst/>
-                          <a:latin typeface="DIN-Regular"/>
-                        </a:rPr>
-                        <a:t>i</a:t>
-                      </a:r>
-                      <a:r>
-                        <a:rPr lang="en-US" sz="900" dirty="0">
-                          <a:solidFill>
-                            <a:srgbClr val="707070"/>
-                          </a:solidFill>
-                          <a:effectLst/>
-                          <a:latin typeface="DIN-Regular"/>
-                        </a:rPr>
-                        <a:t> </a:t>
-                      </a:r>
-                      <a:r>
-                        <a:rPr lang="en-US" sz="900" dirty="0" err="1">
-                          <a:solidFill>
-                            <a:srgbClr val="707070"/>
-                          </a:solidFill>
-                          <a:effectLst/>
-                          <a:latin typeface="DIN-Regular"/>
-                        </a:rPr>
-                        <a:t>sisalda</a:t>
-                      </a:r>
-                      <a:r>
-                        <a:rPr lang="en-US" sz="900" dirty="0">
-                          <a:solidFill>
-                            <a:srgbClr val="707070"/>
-                          </a:solidFill>
-                          <a:effectLst/>
-                          <a:latin typeface="DIN-Regular"/>
-                        </a:rPr>
-                        <a:t> </a:t>
-                      </a:r>
-                      <a:r>
-                        <a:rPr lang="en-US" sz="900" dirty="0" err="1">
-                          <a:solidFill>
-                            <a:srgbClr val="707070"/>
-                          </a:solidFill>
-                          <a:effectLst/>
-                          <a:latin typeface="DIN-Regular"/>
-                        </a:rPr>
-                        <a:t>antud</a:t>
-                      </a:r>
-                      <a:r>
-                        <a:rPr lang="en-US" sz="900" dirty="0">
-                          <a:solidFill>
-                            <a:srgbClr val="707070"/>
-                          </a:solidFill>
-                          <a:effectLst/>
-                          <a:latin typeface="DIN-Regular"/>
-                        </a:rPr>
-                        <a:t> </a:t>
-                      </a:r>
-                      <a:r>
-                        <a:rPr lang="en-US" sz="900" dirty="0" err="1">
-                          <a:solidFill>
-                            <a:srgbClr val="707070"/>
-                          </a:solidFill>
-                          <a:effectLst/>
-                          <a:latin typeface="DIN-Regular"/>
-                        </a:rPr>
-                        <a:t>profiili</a:t>
+                        <a:t>-</a:t>
                       </a:r>
                       <a:endParaRPr lang="en-US" sz="900" dirty="0">
                         <a:solidFill>
@@ -9343,7 +6215,7 @@
                 </a:tc>
                 <a:extLst>
                   <a:ext uri="{0D108BD9-81ED-4DB2-BD59-A6C34878D82A}">
-                    <a16:rowId xmlns="" xmlns:a16="http://schemas.microsoft.com/office/drawing/2014/main" val="3502009234"/>
+                    <a16:rowId xmlns:a16="http://schemas.microsoft.com/office/drawing/2014/main" val="3502009234"/>
                   </a:ext>
                 </a:extLst>
               </a:tr>
@@ -9512,14 +6384,44 @@
                     <a:p>
                       <a:pPr algn="l" fontAlgn="t"/>
                       <a:r>
-                        <a:rPr lang="et-EE" sz="900" i="1" dirty="0">
+                        <a:rPr lang="et-EE" sz="900" dirty="0" smtClean="0">
                           <a:solidFill>
                             <a:srgbClr val="707070"/>
                           </a:solidFill>
                           <a:effectLst/>
                           <a:latin typeface="DIN-Regular"/>
                         </a:rPr>
-                        <a:t>N/A</a:t>
+                        <a:t>ETSI EN 319 162 [9], </a:t>
+                      </a:r>
+                      <a:r>
+                        <a:rPr lang="en-US" sz="900" dirty="0" err="1" smtClean="0">
+                          <a:solidFill>
+                            <a:srgbClr val="707070"/>
+                          </a:solidFill>
+                          <a:effectLst/>
+                          <a:latin typeface="DIN-Regular"/>
+                        </a:rPr>
+                        <a:t>ptk</a:t>
+                      </a:r>
+                      <a:endParaRPr lang="et-EE" sz="900" dirty="0" smtClean="0">
+                        <a:solidFill>
+                          <a:srgbClr val="707070"/>
+                        </a:solidFill>
+                        <a:effectLst/>
+                        <a:latin typeface="DIN-Regular"/>
+                      </a:endParaRPr>
+                    </a:p>
+                    <a:p>
+                      <a:pPr algn="l" fontAlgn="t"/>
+                      <a:r>
+                        <a:rPr lang="et-EE" sz="900" dirty="0" smtClean="0">
+                          <a:solidFill>
+                            <a:srgbClr val="707070"/>
+                          </a:solidFill>
+                          <a:effectLst/>
+                          <a:latin typeface="DIN-Regular"/>
+                        </a:rPr>
+                        <a:t>4.4.4</a:t>
                       </a:r>
                       <a:endParaRPr lang="et-EE" sz="900" dirty="0">
                         <a:solidFill>
@@ -9595,154 +6497,14 @@
                         <a:defRPr/>
                       </a:pPr>
                       <a:r>
-                        <a:rPr lang="en-US" sz="900" dirty="0" err="1">
+                        <a:rPr lang="et-EE" sz="900" dirty="0" smtClean="0">
                           <a:solidFill>
                             <a:srgbClr val="707070"/>
                           </a:solidFill>
                           <a:effectLst/>
                           <a:latin typeface="DIN-Regular"/>
                         </a:rPr>
-                        <a:t>Uus</a:t>
-                      </a:r>
-                      <a:r>
-                        <a:rPr lang="en-US" sz="900" dirty="0">
-                          <a:solidFill>
-                            <a:srgbClr val="707070"/>
-                          </a:solidFill>
-                          <a:effectLst/>
-                          <a:latin typeface="DIN-Regular"/>
-                        </a:rPr>
-                        <a:t> ETSI EN </a:t>
-                      </a:r>
-                      <a:r>
-                        <a:rPr lang="en-US" sz="900" dirty="0" err="1">
-                          <a:solidFill>
-                            <a:srgbClr val="707070"/>
-                          </a:solidFill>
-                          <a:effectLst/>
-                          <a:latin typeface="DIN-Regular"/>
-                        </a:rPr>
-                        <a:t>standardi</a:t>
-                      </a:r>
-                      <a:r>
-                        <a:rPr lang="en-US" sz="900" dirty="0">
-                          <a:solidFill>
-                            <a:srgbClr val="707070"/>
-                          </a:solidFill>
-                          <a:effectLst/>
-                          <a:latin typeface="DIN-Regular"/>
-                        </a:rPr>
-                        <a:t> </a:t>
-                      </a:r>
-                      <a:r>
-                        <a:rPr lang="et-EE" sz="900" dirty="0" err="1">
-                          <a:solidFill>
-                            <a:srgbClr val="707070"/>
-                          </a:solidFill>
-                          <a:effectLst/>
-                          <a:latin typeface="DIN-Regular"/>
-                        </a:rPr>
-                        <a:t>baasp</a:t>
-                      </a:r>
-                      <a:r>
-                        <a:rPr lang="en-US" sz="900" dirty="0" err="1">
-                          <a:solidFill>
-                            <a:srgbClr val="707070"/>
-                          </a:solidFill>
-                          <a:effectLst/>
-                          <a:latin typeface="DIN-Regular"/>
-                        </a:rPr>
-                        <a:t>rofiil</a:t>
-                      </a:r>
-                      <a:r>
-                        <a:rPr lang="en-US" sz="900" baseline="0" dirty="0">
-                          <a:solidFill>
-                            <a:srgbClr val="707070"/>
-                          </a:solidFill>
-                          <a:effectLst/>
-                          <a:latin typeface="DIN-Regular"/>
-                        </a:rPr>
-                        <a:t> </a:t>
-                      </a:r>
-                      <a:r>
-                        <a:rPr lang="en-US" sz="900" baseline="0" dirty="0" err="1">
-                          <a:solidFill>
-                            <a:srgbClr val="707070"/>
-                          </a:solidFill>
-                          <a:effectLst/>
-                          <a:latin typeface="DIN-Regular"/>
-                        </a:rPr>
-                        <a:t>e</a:t>
-                      </a:r>
-                      <a:r>
-                        <a:rPr lang="en-US" sz="900" dirty="0" err="1">
-                          <a:solidFill>
-                            <a:srgbClr val="707070"/>
-                          </a:solidFill>
-                          <a:effectLst/>
-                          <a:latin typeface="DIN-Regular"/>
-                        </a:rPr>
-                        <a:t>i</a:t>
-                      </a:r>
-                      <a:r>
-                        <a:rPr lang="en-US" sz="900" dirty="0">
-                          <a:solidFill>
-                            <a:srgbClr val="707070"/>
-                          </a:solidFill>
-                          <a:effectLst/>
-                          <a:latin typeface="DIN-Regular"/>
-                        </a:rPr>
-                        <a:t> </a:t>
-                      </a:r>
-                      <a:r>
-                        <a:rPr lang="en-US" sz="900" dirty="0" err="1">
-                          <a:solidFill>
-                            <a:srgbClr val="707070"/>
-                          </a:solidFill>
-                          <a:effectLst/>
-                          <a:latin typeface="DIN-Regular"/>
-                        </a:rPr>
-                        <a:t>sisalda</a:t>
-                      </a:r>
-                      <a:r>
-                        <a:rPr lang="en-US" sz="900" dirty="0">
-                          <a:solidFill>
-                            <a:srgbClr val="707070"/>
-                          </a:solidFill>
-                          <a:effectLst/>
-                          <a:latin typeface="DIN-Regular"/>
-                        </a:rPr>
-                        <a:t> </a:t>
-                      </a:r>
-                      <a:r>
-                        <a:rPr lang="en-US" sz="900" dirty="0" err="1">
-                          <a:solidFill>
-                            <a:srgbClr val="707070"/>
-                          </a:solidFill>
-                          <a:effectLst/>
-                          <a:latin typeface="DIN-Regular"/>
-                        </a:rPr>
-                        <a:t>antud</a:t>
-                      </a:r>
-                      <a:r>
-                        <a:rPr lang="en-US" sz="900" dirty="0">
-                          <a:solidFill>
-                            <a:srgbClr val="707070"/>
-                          </a:solidFill>
-                          <a:effectLst/>
-                          <a:latin typeface="DIN-Regular"/>
-                        </a:rPr>
-                        <a:t> </a:t>
-                      </a:r>
-                      <a:r>
-                        <a:rPr lang="en-US" sz="900" dirty="0" err="1">
-                          <a:solidFill>
-                            <a:srgbClr val="707070"/>
-                          </a:solidFill>
-                          <a:effectLst/>
-                          <a:latin typeface="DIN-Regular"/>
-                        </a:rPr>
-                        <a:t>profiili</a:t>
+                        <a:t>-</a:t>
                       </a:r>
                       <a:endParaRPr lang="en-US" sz="900" dirty="0">
                         <a:solidFill>
@@ -9797,7 +6559,7 @@
                 </a:tc>
                 <a:extLst>
                   <a:ext uri="{0D108BD9-81ED-4DB2-BD59-A6C34878D82A}">
-                    <a16:rowId xmlns="" xmlns:a16="http://schemas.microsoft.com/office/drawing/2014/main" val="4107273172"/>
+                    <a16:rowId xmlns:a16="http://schemas.microsoft.com/office/drawing/2014/main" val="4107273172"/>
                   </a:ext>
                 </a:extLst>
               </a:tr>
@@ -10288,7 +7050,7 @@
                 </a:tc>
                 <a:extLst>
                   <a:ext uri="{0D108BD9-81ED-4DB2-BD59-A6C34878D82A}">
-                    <a16:rowId xmlns="" xmlns:a16="http://schemas.microsoft.com/office/drawing/2014/main" val="1079917109"/>
+                    <a16:rowId xmlns:a16="http://schemas.microsoft.com/office/drawing/2014/main" val="1079917109"/>
                   </a:ext>
                 </a:extLst>
               </a:tr>
@@ -10602,7 +7364,7 @@
                 </a:tc>
                 <a:extLst>
                   <a:ext uri="{0D108BD9-81ED-4DB2-BD59-A6C34878D82A}">
-                    <a16:rowId xmlns="" xmlns:a16="http://schemas.microsoft.com/office/drawing/2014/main" val="3714593207"/>
+                    <a16:rowId xmlns:a16="http://schemas.microsoft.com/office/drawing/2014/main" val="3714593207"/>
                   </a:ext>
                 </a:extLst>
               </a:tr>
@@ -10916,7 +7678,7 @@
                 </a:tc>
                 <a:extLst>
                   <a:ext uri="{0D108BD9-81ED-4DB2-BD59-A6C34878D82A}">
-                    <a16:rowId xmlns="" xmlns:a16="http://schemas.microsoft.com/office/drawing/2014/main" val="3957460097"/>
+                    <a16:rowId xmlns:a16="http://schemas.microsoft.com/office/drawing/2014/main" val="3957460097"/>
                   </a:ext>
                 </a:extLst>
               </a:tr>
@@ -10937,7 +7699,7 @@
   <p:timing>
     <p:tnLst>
       <p:par>
-        <p:cTn xmlns:p14="http://schemas.microsoft.com/office/powerpoint/2010/main" id="1" dur="indefinite" restart="never" nodeType="tmRoot"/>
+        <p:cTn id="1" dur="indefinite" restart="never" nodeType="tmRoot"/>
       </p:par>
     </p:tnLst>
   </p:timing>
@@ -11340,15 +8102,15 @@
                   <a:srgbClr val="707070"/>
                 </a:solidFill>
               </a:rPr>
-              <a:t>  "</a:t>
-            </a:r>
-            <a:r>
-              <a:rPr lang="en-US" dirty="0" err="1" smtClean="0">
+              <a:t>  „</a:t>
+            </a:r>
+            <a:r>
+              <a:rPr lang="et-EE" dirty="0" smtClean="0">
                 <a:solidFill>
                   <a:srgbClr val="707070"/>
                 </a:solidFill>
               </a:rPr>
-              <a:t>documentType</a:t>
+              <a:t>report</a:t>
             </a:r>
             <a:r>
               <a:rPr lang="en-US" dirty="0" smtClean="0">
@@ -11356,7 +8118,23 @@
                   <a:srgbClr val="707070"/>
                 </a:solidFill>
               </a:rPr>
-              <a:t>":"DDOC",</a:t>
+              <a:t>Type":"</a:t>
+            </a:r>
+            <a:r>
+              <a:rPr lang="et-EE" dirty="0" smtClean="0">
+                <a:solidFill>
+                  <a:srgbClr val="707070"/>
+                </a:solidFill>
+              </a:rPr>
+              <a:t>Simple</a:t>
+            </a:r>
+            <a:r>
+              <a:rPr lang="en-US" dirty="0" smtClean="0">
+                <a:solidFill>
+                  <a:srgbClr val="707070"/>
+                </a:solidFill>
+              </a:rPr>
+              <a:t>",</a:t>
             </a:r>
             <a:endParaRPr lang="et-EE" dirty="0" smtClean="0">
               <a:solidFill>
@@ -11414,7 +8192,31 @@
                   <a:srgbClr val="707070"/>
                 </a:solidFill>
               </a:rPr>
-              <a:t>": "POLv1"</a:t>
+              <a:t>": "</a:t>
+            </a:r>
+            <a:r>
+              <a:rPr lang="en-US" dirty="0" err="1" smtClean="0">
+                <a:solidFill>
+                  <a:srgbClr val="707070"/>
+                </a:solidFill>
+              </a:rPr>
+              <a:t>POLv</a:t>
+            </a:r>
+            <a:r>
+              <a:rPr lang="et-EE" dirty="0">
+                <a:solidFill>
+                  <a:srgbClr val="707070"/>
+                </a:solidFill>
+              </a:rPr>
+              <a:t>4</a:t>
+            </a:r>
+            <a:r>
+              <a:rPr lang="en-US" dirty="0" smtClean="0">
+                <a:solidFill>
+                  <a:srgbClr val="707070"/>
+                </a:solidFill>
+              </a:rPr>
+              <a:t>"</a:t>
             </a:r>
             <a:endParaRPr lang="et-EE" dirty="0" smtClean="0">
               <a:solidFill>
@@ -11471,7 +8273,7 @@
   <p:timing>
     <p:tnLst>
       <p:par>
-        <p:cTn xmlns:p14="http://schemas.microsoft.com/office/powerpoint/2010/main" id="1" dur="indefinite" restart="never" nodeType="tmRoot"/>
+        <p:cTn id="1" dur="indefinite" restart="never" nodeType="tmRoot"/>
       </p:par>
     </p:tnLst>
   </p:timing>
@@ -11521,7 +8323,7 @@
       </p:sp>
       <p:pic>
         <p:nvPicPr>
-          <p:cNvPr id="5" name="Picture 4"/>
+          <p:cNvPr id="4" name="Picture 3"/>
           <p:cNvPicPr>
             <a:picLocks noChangeAspect="1"/>
           </p:cNvPicPr>
@@ -11535,8 +8337,8 @@
         </p:blipFill>
         <p:spPr>
           <a:xfrm>
-            <a:off x="1439186" y="1621964"/>
-            <a:ext cx="5955527" cy="4767302"/>
+            <a:off x="1285275" y="1810830"/>
+            <a:ext cx="6573450" cy="2905506"/>
           </a:xfrm>
           <a:prstGeom prst="rect">
             <a:avLst/>
@@ -11556,7 +8358,7 @@
   <p:timing>
     <p:tnLst>
       <p:par>
-        <p:cTn xmlns:p14="http://schemas.microsoft.com/office/powerpoint/2010/main" id="1" dur="indefinite" restart="never" nodeType="tmRoot"/>
+        <p:cTn id="1" dur="indefinite" restart="never" nodeType="tmRoot"/>
       </p:par>
     </p:tnLst>
   </p:timing>
@@ -11664,16 +8466,7 @@
                 </a:solidFill>
                 <a:hlinkClick r:id="rId2"/>
               </a:rPr>
-              <a:t>https</a:t>
-            </a:r>
-            <a:r>
-              <a:rPr lang="en-US" dirty="0" smtClean="0">
-                <a:solidFill>
-                  <a:srgbClr val="595959"/>
-                </a:solidFill>
-                <a:hlinkClick r:id="rId2"/>
-              </a:rPr>
-              <a:t>://siva-arendus.eesti.ee/</a:t>
+              <a:t>https://siva-arendus.eesti.ee/V2</a:t>
             </a:r>
             <a:r>
               <a:rPr lang="et-EE" dirty="0" smtClean="0">
@@ -11905,7 +8698,7 @@
   <p:timing>
     <p:tnLst>
       <p:par>
-        <p:cTn xmlns:p14="http://schemas.microsoft.com/office/powerpoint/2010/main" id="1" dur="indefinite" restart="never" nodeType="tmRoot"/>
+        <p:cTn id="1" dur="indefinite" restart="never" nodeType="tmRoot"/>
       </p:par>
     </p:tnLst>
   </p:timing>

</xml_diff>